<commit_message>
Tests results multinomial models emmeans 1.5.3 vs 1.5.4
</commit_message>
<xml_diff>
--- a/plots/2021_02_09/multinomial_Re_growthadv_B117_WT.pptx
+++ b/plots/2021_02_09/multinomial_Re_growthadv_B117_WT.pptx
@@ -3355,174 +3355,174 @@
           </p:nvSpPr>
           <p:spPr>
             <a:xfrm>
-              <a:off x="4822518" y="3201000"/>
-              <a:ext cx="5852092" cy="829147"/>
+              <a:off x="4822518" y="3197785"/>
+              <a:ext cx="5852092" cy="796538"/>
             </a:xfrm>
             <a:custGeom>
               <a:avLst/>
               <a:pathLst>
-                <a:path w="5852092" h="829147">
+                <a:path w="5852092" h="796538">
                   <a:moveTo>
                     <a:pt x="0" y="0"/>
                   </a:moveTo>
                   <a:lnTo>
-                    <a:pt x="225080" y="2572"/>
-                  </a:lnTo>
-                  <a:lnTo>
-                    <a:pt x="450160" y="10143"/>
-                  </a:lnTo>
-                  <a:lnTo>
-                    <a:pt x="675241" y="22612"/>
-                  </a:lnTo>
-                  <a:lnTo>
-                    <a:pt x="900321" y="39727"/>
-                  </a:lnTo>
-                  <a:lnTo>
-                    <a:pt x="1125402" y="60846"/>
-                  </a:lnTo>
-                  <a:lnTo>
-                    <a:pt x="1350482" y="84162"/>
-                  </a:lnTo>
-                  <a:lnTo>
-                    <a:pt x="1575563" y="104305"/>
-                  </a:lnTo>
-                  <a:lnTo>
-                    <a:pt x="1800643" y="110500"/>
-                  </a:lnTo>
-                  <a:lnTo>
-                    <a:pt x="2025724" y="106777"/>
-                  </a:lnTo>
-                  <a:lnTo>
-                    <a:pt x="2250804" y="109102"/>
-                  </a:lnTo>
-                  <a:lnTo>
-                    <a:pt x="2475885" y="121762"/>
-                  </a:lnTo>
-                  <a:lnTo>
-                    <a:pt x="2700965" y="145869"/>
-                  </a:lnTo>
-                  <a:lnTo>
-                    <a:pt x="2926046" y="181523"/>
-                  </a:lnTo>
-                  <a:lnTo>
-                    <a:pt x="3151126" y="228023"/>
-                  </a:lnTo>
-                  <a:lnTo>
-                    <a:pt x="3376207" y="283130"/>
-                  </a:lnTo>
-                  <a:lnTo>
-                    <a:pt x="3601287" y="341207"/>
-                  </a:lnTo>
-                  <a:lnTo>
-                    <a:pt x="3826368" y="387184"/>
-                  </a:lnTo>
-                  <a:lnTo>
-                    <a:pt x="4051448" y="417688"/>
-                  </a:lnTo>
-                  <a:lnTo>
-                    <a:pt x="4276529" y="439003"/>
-                  </a:lnTo>
-                  <a:lnTo>
-                    <a:pt x="4501609" y="454488"/>
-                  </a:lnTo>
-                  <a:lnTo>
-                    <a:pt x="4726690" y="465696"/>
-                  </a:lnTo>
-                  <a:lnTo>
-                    <a:pt x="4951770" y="473360"/>
-                  </a:lnTo>
-                  <a:lnTo>
-                    <a:pt x="5176851" y="477835"/>
-                  </a:lnTo>
-                  <a:lnTo>
-                    <a:pt x="5401931" y="479288"/>
-                  </a:lnTo>
-                  <a:lnTo>
-                    <a:pt x="5627012" y="479288"/>
-                  </a:lnTo>
-                  <a:lnTo>
-                    <a:pt x="5852092" y="479288"/>
-                  </a:lnTo>
-                  <a:lnTo>
-                    <a:pt x="5852092" y="829147"/>
-                  </a:lnTo>
-                  <a:lnTo>
-                    <a:pt x="5627012" y="829147"/>
-                  </a:lnTo>
-                  <a:lnTo>
-                    <a:pt x="5401931" y="829147"/>
-                  </a:lnTo>
-                  <a:lnTo>
-                    <a:pt x="5176851" y="823298"/>
-                  </a:lnTo>
-                  <a:lnTo>
-                    <a:pt x="4951770" y="805567"/>
-                  </a:lnTo>
-                  <a:lnTo>
-                    <a:pt x="4726690" y="776276"/>
-                  </a:lnTo>
-                  <a:lnTo>
-                    <a:pt x="4501609" y="736039"/>
-                  </a:lnTo>
-                  <a:lnTo>
-                    <a:pt x="4276529" y="685944"/>
-                  </a:lnTo>
-                  <a:lnTo>
-                    <a:pt x="4051448" y="627983"/>
-                  </a:lnTo>
-                  <a:lnTo>
-                    <a:pt x="3826368" y="566031"/>
-                  </a:lnTo>
-                  <a:lnTo>
-                    <a:pt x="3601287" y="506953"/>
-                  </a:lnTo>
-                  <a:lnTo>
-                    <a:pt x="3376207" y="459941"/>
-                  </a:lnTo>
-                  <a:lnTo>
-                    <a:pt x="3151126" y="422197"/>
-                  </a:lnTo>
-                  <a:lnTo>
-                    <a:pt x="2926046" y="387493"/>
-                  </a:lnTo>
-                  <a:lnTo>
-                    <a:pt x="2700965" y="353154"/>
-                  </a:lnTo>
-                  <a:lnTo>
-                    <a:pt x="2475885" y="318185"/>
-                  </a:lnTo>
-                  <a:lnTo>
-                    <a:pt x="2250804" y="282518"/>
-                  </a:lnTo>
-                  <a:lnTo>
-                    <a:pt x="2025724" y="247222"/>
-                  </a:lnTo>
-                  <a:lnTo>
-                    <a:pt x="1800643" y="216657"/>
-                  </a:lnTo>
-                  <a:lnTo>
-                    <a:pt x="1575563" y="203117"/>
-                  </a:lnTo>
-                  <a:lnTo>
-                    <a:pt x="1350482" y="206541"/>
-                  </a:lnTo>
-                  <a:lnTo>
-                    <a:pt x="1125402" y="215984"/>
-                  </a:lnTo>
-                  <a:lnTo>
-                    <a:pt x="900321" y="225936"/>
-                  </a:lnTo>
-                  <a:lnTo>
-                    <a:pt x="675241" y="234476"/>
-                  </a:lnTo>
-                  <a:lnTo>
-                    <a:pt x="450160" y="240874"/>
-                  </a:lnTo>
-                  <a:lnTo>
-                    <a:pt x="225080" y="244815"/>
-                  </a:lnTo>
-                  <a:lnTo>
-                    <a:pt x="0" y="246163"/>
+                    <a:pt x="225080" y="2368"/>
+                  </a:lnTo>
+                  <a:lnTo>
+                    <a:pt x="450160" y="9352"/>
+                  </a:lnTo>
+                  <a:lnTo>
+                    <a:pt x="675241" y="20914"/>
+                  </a:lnTo>
+                  <a:lnTo>
+                    <a:pt x="900321" y="36956"/>
+                  </a:lnTo>
+                  <a:lnTo>
+                    <a:pt x="1125402" y="57231"/>
+                  </a:lnTo>
+                  <a:lnTo>
+                    <a:pt x="1350482" y="81058"/>
+                  </a:lnTo>
+                  <a:lnTo>
+                    <a:pt x="1575563" y="106305"/>
+                  </a:lnTo>
+                  <a:lnTo>
+                    <a:pt x="1800643" y="125936"/>
+                  </a:lnTo>
+                  <a:lnTo>
+                    <a:pt x="2025724" y="133654"/>
+                  </a:lnTo>
+                  <a:lnTo>
+                    <a:pt x="2250804" y="141483"/>
+                  </a:lnTo>
+                  <a:lnTo>
+                    <a:pt x="2475885" y="157225"/>
+                  </a:lnTo>
+                  <a:lnTo>
+                    <a:pt x="2700965" y="183310"/>
+                  </a:lnTo>
+                  <a:lnTo>
+                    <a:pt x="2926046" y="220412"/>
+                  </a:lnTo>
+                  <a:lnTo>
+                    <a:pt x="3151126" y="268262"/>
+                  </a:lnTo>
+                  <a:lnTo>
+                    <a:pt x="3376207" y="324753"/>
+                  </a:lnTo>
+                  <a:lnTo>
+                    <a:pt x="3601287" y="382258"/>
+                  </a:lnTo>
+                  <a:lnTo>
+                    <a:pt x="3826368" y="424065"/>
+                  </a:lnTo>
+                  <a:lnTo>
+                    <a:pt x="4051448" y="451805"/>
+                  </a:lnTo>
+                  <a:lnTo>
+                    <a:pt x="4276529" y="472541"/>
+                  </a:lnTo>
+                  <a:lnTo>
+                    <a:pt x="4501609" y="488578"/>
+                  </a:lnTo>
+                  <a:lnTo>
+                    <a:pt x="4726690" y="500706"/>
+                  </a:lnTo>
+                  <a:lnTo>
+                    <a:pt x="4951770" y="509233"/>
+                  </a:lnTo>
+                  <a:lnTo>
+                    <a:pt x="5176851" y="514295"/>
+                  </a:lnTo>
+                  <a:lnTo>
+                    <a:pt x="5401931" y="515950"/>
+                  </a:lnTo>
+                  <a:lnTo>
+                    <a:pt x="5627012" y="515950"/>
+                  </a:lnTo>
+                  <a:lnTo>
+                    <a:pt x="5852092" y="515950"/>
+                  </a:lnTo>
+                  <a:lnTo>
+                    <a:pt x="5852092" y="796538"/>
+                  </a:lnTo>
+                  <a:lnTo>
+                    <a:pt x="5627012" y="796538"/>
+                  </a:lnTo>
+                  <a:lnTo>
+                    <a:pt x="5401931" y="796538"/>
+                  </a:lnTo>
+                  <a:lnTo>
+                    <a:pt x="5176851" y="790939"/>
+                  </a:lnTo>
+                  <a:lnTo>
+                    <a:pt x="4951770" y="773931"/>
+                  </a:lnTo>
+                  <a:lnTo>
+                    <a:pt x="4726690" y="745714"/>
+                  </a:lnTo>
+                  <a:lnTo>
+                    <a:pt x="4501609" y="706653"/>
+                  </a:lnTo>
+                  <a:lnTo>
+                    <a:pt x="4276529" y="657377"/>
+                  </a:lnTo>
+                  <a:lnTo>
+                    <a:pt x="4051448" y="599070"/>
+                  </a:lnTo>
+                  <a:lnTo>
+                    <a:pt x="3826368" y="534504"/>
+                  </a:lnTo>
+                  <a:lnTo>
+                    <a:pt x="3601287" y="471268"/>
+                  </a:lnTo>
+                  <a:lnTo>
+                    <a:pt x="3376207" y="423579"/>
+                  </a:lnTo>
+                  <a:lnTo>
+                    <a:pt x="3151126" y="387105"/>
+                  </a:lnTo>
+                  <a:lnTo>
+                    <a:pt x="2926046" y="353691"/>
+                  </a:lnTo>
+                  <a:lnTo>
+                    <a:pt x="2700965" y="320834"/>
+                  </a:lnTo>
+                  <a:lnTo>
+                    <a:pt x="2475885" y="287983"/>
+                  </a:lnTo>
+                  <a:lnTo>
+                    <a:pt x="2250804" y="255639"/>
+                  </a:lnTo>
+                  <a:lnTo>
+                    <a:pt x="2025724" y="226168"/>
+                  </a:lnTo>
+                  <a:lnTo>
+                    <a:pt x="1800643" y="207398"/>
+                  </a:lnTo>
+                  <a:lnTo>
+                    <a:pt x="1575563" y="207573"/>
+                  </a:lnTo>
+                  <a:lnTo>
+                    <a:pt x="1350482" y="216253"/>
+                  </a:lnTo>
+                  <a:lnTo>
+                    <a:pt x="1125402" y="226273"/>
+                  </a:lnTo>
+                  <a:lnTo>
+                    <a:pt x="900321" y="235391"/>
+                  </a:lnTo>
+                  <a:lnTo>
+                    <a:pt x="675241" y="242840"/>
+                  </a:lnTo>
+                  <a:lnTo>
+                    <a:pt x="450160" y="248304"/>
+                  </a:lnTo>
+                  <a:lnTo>
+                    <a:pt x="225080" y="251636"/>
+                  </a:lnTo>
+                  <a:lnTo>
+                    <a:pt x="0" y="252771"/>
                   </a:lnTo>
                   <a:close/>
                 </a:path>
@@ -3548,96 +3548,96 @@
           </p:nvSpPr>
           <p:spPr>
             <a:xfrm>
-              <a:off x="4822518" y="3201000"/>
-              <a:ext cx="5852092" cy="479288"/>
+              <a:off x="4822518" y="3197785"/>
+              <a:ext cx="5852092" cy="515950"/>
             </a:xfrm>
             <a:custGeom>
               <a:avLst/>
               <a:pathLst>
-                <a:path w="5852092" h="479288">
+                <a:path w="5852092" h="515950">
                   <a:moveTo>
                     <a:pt x="0" y="0"/>
                   </a:moveTo>
                   <a:lnTo>
-                    <a:pt x="225080" y="2572"/>
-                  </a:lnTo>
-                  <a:lnTo>
-                    <a:pt x="450160" y="10143"/>
-                  </a:lnTo>
-                  <a:lnTo>
-                    <a:pt x="675241" y="22612"/>
-                  </a:lnTo>
-                  <a:lnTo>
-                    <a:pt x="900321" y="39727"/>
-                  </a:lnTo>
-                  <a:lnTo>
-                    <a:pt x="1125402" y="60846"/>
-                  </a:lnTo>
-                  <a:lnTo>
-                    <a:pt x="1350482" y="84162"/>
-                  </a:lnTo>
-                  <a:lnTo>
-                    <a:pt x="1575563" y="104305"/>
-                  </a:lnTo>
-                  <a:lnTo>
-                    <a:pt x="1800643" y="110500"/>
-                  </a:lnTo>
-                  <a:lnTo>
-                    <a:pt x="2025724" y="106777"/>
-                  </a:lnTo>
-                  <a:lnTo>
-                    <a:pt x="2250804" y="109102"/>
-                  </a:lnTo>
-                  <a:lnTo>
-                    <a:pt x="2475885" y="121762"/>
-                  </a:lnTo>
-                  <a:lnTo>
-                    <a:pt x="2700965" y="145869"/>
-                  </a:lnTo>
-                  <a:lnTo>
-                    <a:pt x="2926046" y="181523"/>
-                  </a:lnTo>
-                  <a:lnTo>
-                    <a:pt x="3151126" y="228023"/>
-                  </a:lnTo>
-                  <a:lnTo>
-                    <a:pt x="3376207" y="283130"/>
-                  </a:lnTo>
-                  <a:lnTo>
-                    <a:pt x="3601287" y="341207"/>
-                  </a:lnTo>
-                  <a:lnTo>
-                    <a:pt x="3826368" y="387184"/>
-                  </a:lnTo>
-                  <a:lnTo>
-                    <a:pt x="4051448" y="417688"/>
-                  </a:lnTo>
-                  <a:lnTo>
-                    <a:pt x="4276529" y="439003"/>
-                  </a:lnTo>
-                  <a:lnTo>
-                    <a:pt x="4501609" y="454488"/>
-                  </a:lnTo>
-                  <a:lnTo>
-                    <a:pt x="4726690" y="465696"/>
-                  </a:lnTo>
-                  <a:lnTo>
-                    <a:pt x="4951770" y="473360"/>
-                  </a:lnTo>
-                  <a:lnTo>
-                    <a:pt x="5176851" y="477835"/>
-                  </a:lnTo>
-                  <a:lnTo>
-                    <a:pt x="5401931" y="479288"/>
-                  </a:lnTo>
-                  <a:lnTo>
-                    <a:pt x="5627012" y="479288"/>
-                  </a:lnTo>
-                  <a:lnTo>
-                    <a:pt x="5852092" y="479288"/>
-                  </a:lnTo>
-                  <a:lnTo>
-                    <a:pt x="5852092" y="479288"/>
+                    <a:pt x="225080" y="2368"/>
+                  </a:lnTo>
+                  <a:lnTo>
+                    <a:pt x="450160" y="9352"/>
+                  </a:lnTo>
+                  <a:lnTo>
+                    <a:pt x="675241" y="20914"/>
+                  </a:lnTo>
+                  <a:lnTo>
+                    <a:pt x="900321" y="36956"/>
+                  </a:lnTo>
+                  <a:lnTo>
+                    <a:pt x="1125402" y="57231"/>
+                  </a:lnTo>
+                  <a:lnTo>
+                    <a:pt x="1350482" y="81058"/>
+                  </a:lnTo>
+                  <a:lnTo>
+                    <a:pt x="1575563" y="106305"/>
+                  </a:lnTo>
+                  <a:lnTo>
+                    <a:pt x="1800643" y="125936"/>
+                  </a:lnTo>
+                  <a:lnTo>
+                    <a:pt x="2025724" y="133654"/>
+                  </a:lnTo>
+                  <a:lnTo>
+                    <a:pt x="2250804" y="141483"/>
+                  </a:lnTo>
+                  <a:lnTo>
+                    <a:pt x="2475885" y="157225"/>
+                  </a:lnTo>
+                  <a:lnTo>
+                    <a:pt x="2700965" y="183310"/>
+                  </a:lnTo>
+                  <a:lnTo>
+                    <a:pt x="2926046" y="220412"/>
+                  </a:lnTo>
+                  <a:lnTo>
+                    <a:pt x="3151126" y="268262"/>
+                  </a:lnTo>
+                  <a:lnTo>
+                    <a:pt x="3376207" y="324753"/>
+                  </a:lnTo>
+                  <a:lnTo>
+                    <a:pt x="3601287" y="382258"/>
+                  </a:lnTo>
+                  <a:lnTo>
+                    <a:pt x="3826368" y="424065"/>
+                  </a:lnTo>
+                  <a:lnTo>
+                    <a:pt x="4051448" y="451805"/>
+                  </a:lnTo>
+                  <a:lnTo>
+                    <a:pt x="4276529" y="472541"/>
+                  </a:lnTo>
+                  <a:lnTo>
+                    <a:pt x="4501609" y="488578"/>
+                  </a:lnTo>
+                  <a:lnTo>
+                    <a:pt x="4726690" y="500706"/>
+                  </a:lnTo>
+                  <a:lnTo>
+                    <a:pt x="4951770" y="509233"/>
+                  </a:lnTo>
+                  <a:lnTo>
+                    <a:pt x="5176851" y="514295"/>
+                  </a:lnTo>
+                  <a:lnTo>
+                    <a:pt x="5401931" y="515950"/>
+                  </a:lnTo>
+                  <a:lnTo>
+                    <a:pt x="5627012" y="515950"/>
+                  </a:lnTo>
+                  <a:lnTo>
+                    <a:pt x="5852092" y="515950"/>
+                  </a:lnTo>
+                  <a:lnTo>
+                    <a:pt x="5852092" y="515950"/>
                   </a:lnTo>
                 </a:path>
               </a:pathLst>
@@ -3657,96 +3657,96 @@
           </p:nvSpPr>
           <p:spPr>
             <a:xfrm>
-              <a:off x="4822518" y="3404118"/>
-              <a:ext cx="5852092" cy="626029"/>
+              <a:off x="4822518" y="3405184"/>
+              <a:ext cx="5852092" cy="589140"/>
             </a:xfrm>
             <a:custGeom>
               <a:avLst/>
               <a:pathLst>
-                <a:path w="5852092" h="626029">
+                <a:path w="5852092" h="589140">
                   <a:moveTo>
-                    <a:pt x="5852092" y="626029"/>
+                    <a:pt x="5852092" y="589140"/>
                   </a:moveTo>
                   <a:lnTo>
-                    <a:pt x="5627012" y="626029"/>
-                  </a:lnTo>
-                  <a:lnTo>
-                    <a:pt x="5401931" y="626029"/>
-                  </a:lnTo>
-                  <a:lnTo>
-                    <a:pt x="5176851" y="620180"/>
-                  </a:lnTo>
-                  <a:lnTo>
-                    <a:pt x="4951770" y="602449"/>
-                  </a:lnTo>
-                  <a:lnTo>
-                    <a:pt x="4726690" y="573158"/>
-                  </a:lnTo>
-                  <a:lnTo>
-                    <a:pt x="4501609" y="532921"/>
-                  </a:lnTo>
-                  <a:lnTo>
-                    <a:pt x="4276529" y="482826"/>
-                  </a:lnTo>
-                  <a:lnTo>
-                    <a:pt x="4051448" y="424865"/>
-                  </a:lnTo>
-                  <a:lnTo>
-                    <a:pt x="3826368" y="362914"/>
-                  </a:lnTo>
-                  <a:lnTo>
-                    <a:pt x="3601287" y="303835"/>
-                  </a:lnTo>
-                  <a:lnTo>
-                    <a:pt x="3376207" y="256824"/>
-                  </a:lnTo>
-                  <a:lnTo>
-                    <a:pt x="3151126" y="219080"/>
-                  </a:lnTo>
-                  <a:lnTo>
-                    <a:pt x="2926046" y="184375"/>
-                  </a:lnTo>
-                  <a:lnTo>
-                    <a:pt x="2700965" y="150037"/>
-                  </a:lnTo>
-                  <a:lnTo>
-                    <a:pt x="2475885" y="115067"/>
-                  </a:lnTo>
-                  <a:lnTo>
-                    <a:pt x="2250804" y="79401"/>
-                  </a:lnTo>
-                  <a:lnTo>
-                    <a:pt x="2025724" y="44105"/>
-                  </a:lnTo>
-                  <a:lnTo>
-                    <a:pt x="1800643" y="13539"/>
-                  </a:lnTo>
-                  <a:lnTo>
-                    <a:pt x="1575563" y="0"/>
-                  </a:lnTo>
-                  <a:lnTo>
-                    <a:pt x="1350482" y="3423"/>
-                  </a:lnTo>
-                  <a:lnTo>
-                    <a:pt x="1125402" y="12866"/>
-                  </a:lnTo>
-                  <a:lnTo>
-                    <a:pt x="900321" y="22818"/>
-                  </a:lnTo>
-                  <a:lnTo>
-                    <a:pt x="675241" y="31359"/>
-                  </a:lnTo>
-                  <a:lnTo>
-                    <a:pt x="450160" y="37756"/>
-                  </a:lnTo>
-                  <a:lnTo>
-                    <a:pt x="225080" y="41697"/>
-                  </a:lnTo>
-                  <a:lnTo>
-                    <a:pt x="0" y="43045"/>
-                  </a:lnTo>
-                  <a:lnTo>
-                    <a:pt x="0" y="43045"/>
+                    <a:pt x="5627012" y="589140"/>
+                  </a:lnTo>
+                  <a:lnTo>
+                    <a:pt x="5401931" y="589140"/>
+                  </a:lnTo>
+                  <a:lnTo>
+                    <a:pt x="5176851" y="583540"/>
+                  </a:lnTo>
+                  <a:lnTo>
+                    <a:pt x="4951770" y="566533"/>
+                  </a:lnTo>
+                  <a:lnTo>
+                    <a:pt x="4726690" y="538315"/>
+                  </a:lnTo>
+                  <a:lnTo>
+                    <a:pt x="4501609" y="499254"/>
+                  </a:lnTo>
+                  <a:lnTo>
+                    <a:pt x="4276529" y="449978"/>
+                  </a:lnTo>
+                  <a:lnTo>
+                    <a:pt x="4051448" y="391671"/>
+                  </a:lnTo>
+                  <a:lnTo>
+                    <a:pt x="3826368" y="327105"/>
+                  </a:lnTo>
+                  <a:lnTo>
+                    <a:pt x="3601287" y="263869"/>
+                  </a:lnTo>
+                  <a:lnTo>
+                    <a:pt x="3376207" y="216180"/>
+                  </a:lnTo>
+                  <a:lnTo>
+                    <a:pt x="3151126" y="179706"/>
+                  </a:lnTo>
+                  <a:lnTo>
+                    <a:pt x="2926046" y="146292"/>
+                  </a:lnTo>
+                  <a:lnTo>
+                    <a:pt x="2700965" y="113436"/>
+                  </a:lnTo>
+                  <a:lnTo>
+                    <a:pt x="2475885" y="80584"/>
+                  </a:lnTo>
+                  <a:lnTo>
+                    <a:pt x="2250804" y="48241"/>
+                  </a:lnTo>
+                  <a:lnTo>
+                    <a:pt x="2025724" y="18769"/>
+                  </a:lnTo>
+                  <a:lnTo>
+                    <a:pt x="1800643" y="0"/>
+                  </a:lnTo>
+                  <a:lnTo>
+                    <a:pt x="1575563" y="174"/>
+                  </a:lnTo>
+                  <a:lnTo>
+                    <a:pt x="1350482" y="8854"/>
+                  </a:lnTo>
+                  <a:lnTo>
+                    <a:pt x="1125402" y="18874"/>
+                  </a:lnTo>
+                  <a:lnTo>
+                    <a:pt x="900321" y="27993"/>
+                  </a:lnTo>
+                  <a:lnTo>
+                    <a:pt x="675241" y="35442"/>
+                  </a:lnTo>
+                  <a:lnTo>
+                    <a:pt x="450160" y="40905"/>
+                  </a:lnTo>
+                  <a:lnTo>
+                    <a:pt x="225080" y="44238"/>
+                  </a:lnTo>
+                  <a:lnTo>
+                    <a:pt x="0" y="45373"/>
+                  </a:lnTo>
+                  <a:lnTo>
+                    <a:pt x="0" y="45373"/>
                   </a:lnTo>
                 </a:path>
               </a:pathLst>
@@ -3766,174 +3766,174 @@
           </p:nvSpPr>
           <p:spPr>
             <a:xfrm>
-              <a:off x="4822518" y="2417475"/>
-              <a:ext cx="5852092" cy="1187743"/>
+              <a:off x="4822518" y="2344232"/>
+              <a:ext cx="5852092" cy="1299398"/>
             </a:xfrm>
             <a:custGeom>
               <a:avLst/>
               <a:pathLst>
-                <a:path w="5852092" h="1187743">
+                <a:path w="5852092" h="1299398">
                   <a:moveTo>
                     <a:pt x="0" y="0"/>
                   </a:moveTo>
                   <a:lnTo>
-                    <a:pt x="225080" y="5252"/>
-                  </a:lnTo>
-                  <a:lnTo>
-                    <a:pt x="450160" y="20786"/>
-                  </a:lnTo>
-                  <a:lnTo>
-                    <a:pt x="675241" y="46667"/>
-                  </a:lnTo>
-                  <a:lnTo>
-                    <a:pt x="900321" y="82982"/>
-                  </a:lnTo>
-                  <a:lnTo>
-                    <a:pt x="1125402" y="129770"/>
-                  </a:lnTo>
-                  <a:lnTo>
-                    <a:pt x="1350482" y="186790"/>
-                  </a:lnTo>
-                  <a:lnTo>
-                    <a:pt x="1575563" y="252559"/>
-                  </a:lnTo>
-                  <a:lnTo>
-                    <a:pt x="1800643" y="320600"/>
-                  </a:lnTo>
-                  <a:lnTo>
-                    <a:pt x="2025724" y="378681"/>
-                  </a:lnTo>
-                  <a:lnTo>
-                    <a:pt x="2250804" y="431306"/>
-                  </a:lnTo>
-                  <a:lnTo>
-                    <a:pt x="2475885" y="483989"/>
-                  </a:lnTo>
-                  <a:lnTo>
-                    <a:pt x="2700965" y="538013"/>
-                  </a:lnTo>
-                  <a:lnTo>
-                    <a:pt x="2926046" y="593399"/>
-                  </a:lnTo>
-                  <a:lnTo>
-                    <a:pt x="3151126" y="649467"/>
-                  </a:lnTo>
-                  <a:lnTo>
-                    <a:pt x="3376207" y="704725"/>
-                  </a:lnTo>
-                  <a:lnTo>
-                    <a:pt x="3601287" y="756630"/>
-                  </a:lnTo>
-                  <a:lnTo>
-                    <a:pt x="3826368" y="800165"/>
-                  </a:lnTo>
-                  <a:lnTo>
-                    <a:pt x="4051448" y="834513"/>
-                  </a:lnTo>
-                  <a:lnTo>
-                    <a:pt x="4276529" y="861777"/>
-                  </a:lnTo>
-                  <a:lnTo>
-                    <a:pt x="4501609" y="883186"/>
-                  </a:lnTo>
-                  <a:lnTo>
-                    <a:pt x="4726690" y="899408"/>
-                  </a:lnTo>
-                  <a:lnTo>
-                    <a:pt x="4951770" y="910801"/>
-                  </a:lnTo>
-                  <a:lnTo>
-                    <a:pt x="5176851" y="917554"/>
-                  </a:lnTo>
-                  <a:lnTo>
-                    <a:pt x="5401931" y="919760"/>
-                  </a:lnTo>
-                  <a:lnTo>
-                    <a:pt x="5627012" y="919760"/>
-                  </a:lnTo>
-                  <a:lnTo>
-                    <a:pt x="5852092" y="919760"/>
-                  </a:lnTo>
-                  <a:lnTo>
-                    <a:pt x="5852092" y="1187743"/>
-                  </a:lnTo>
-                  <a:lnTo>
-                    <a:pt x="5627012" y="1187743"/>
-                  </a:lnTo>
-                  <a:lnTo>
-                    <a:pt x="5401931" y="1187743"/>
-                  </a:lnTo>
-                  <a:lnTo>
-                    <a:pt x="5176851" y="1182987"/>
-                  </a:lnTo>
-                  <a:lnTo>
-                    <a:pt x="4951770" y="1168557"/>
-                  </a:lnTo>
-                  <a:lnTo>
-                    <a:pt x="4726690" y="1144659"/>
-                  </a:lnTo>
-                  <a:lnTo>
-                    <a:pt x="4501609" y="1111677"/>
-                  </a:lnTo>
-                  <a:lnTo>
-                    <a:pt x="4276529" y="1070233"/>
-                  </a:lnTo>
-                  <a:lnTo>
-                    <a:pt x="4051448" y="1021326"/>
-                  </a:lnTo>
-                  <a:lnTo>
-                    <a:pt x="3826368" y="966579"/>
-                  </a:lnTo>
-                  <a:lnTo>
-                    <a:pt x="3601287" y="908542"/>
-                  </a:lnTo>
-                  <a:lnTo>
-                    <a:pt x="3376207" y="850916"/>
-                  </a:lnTo>
-                  <a:lnTo>
-                    <a:pt x="3151126" y="793109"/>
-                  </a:lnTo>
-                  <a:lnTo>
-                    <a:pt x="2926046" y="732643"/>
-                  </a:lnTo>
-                  <a:lnTo>
-                    <a:pt x="2700965" y="668136"/>
-                  </a:lnTo>
-                  <a:lnTo>
-                    <a:pt x="2475885" y="599052"/>
-                  </a:lnTo>
-                  <a:lnTo>
-                    <a:pt x="2250804" y="525587"/>
-                  </a:lnTo>
-                  <a:lnTo>
-                    <a:pt x="2025724" y="449230"/>
-                  </a:lnTo>
-                  <a:lnTo>
-                    <a:pt x="1800643" y="375721"/>
-                  </a:lnTo>
-                  <a:lnTo>
-                    <a:pt x="1575563" y="319937"/>
-                  </a:lnTo>
-                  <a:lnTo>
-                    <a:pt x="1350482" y="279853"/>
-                  </a:lnTo>
-                  <a:lnTo>
-                    <a:pt x="1125402" y="248325"/>
-                  </a:lnTo>
-                  <a:lnTo>
-                    <a:pt x="900321" y="223329"/>
-                  </a:lnTo>
-                  <a:lnTo>
-                    <a:pt x="675241" y="204199"/>
-                  </a:lnTo>
-                  <a:lnTo>
-                    <a:pt x="450160" y="190649"/>
-                  </a:lnTo>
-                  <a:lnTo>
-                    <a:pt x="225080" y="182540"/>
-                  </a:lnTo>
-                  <a:lnTo>
-                    <a:pt x="0" y="179801"/>
+                    <a:pt x="225080" y="6045"/>
+                  </a:lnTo>
+                  <a:lnTo>
+                    <a:pt x="450160" y="23924"/>
+                  </a:lnTo>
+                  <a:lnTo>
+                    <a:pt x="675241" y="53707"/>
+                  </a:lnTo>
+                  <a:lnTo>
+                    <a:pt x="900321" y="95478"/>
+                  </a:lnTo>
+                  <a:lnTo>
+                    <a:pt x="1125402" y="149229"/>
+                  </a:lnTo>
+                  <a:lnTo>
+                    <a:pt x="1350482" y="214558"/>
+                  </a:lnTo>
+                  <a:lnTo>
+                    <a:pt x="1575563" y="289536"/>
+                  </a:lnTo>
+                  <a:lnTo>
+                    <a:pt x="1800643" y="366554"/>
+                  </a:lnTo>
+                  <a:lnTo>
+                    <a:pt x="2025724" y="427854"/>
+                  </a:lnTo>
+                  <a:lnTo>
+                    <a:pt x="2250804" y="478483"/>
+                  </a:lnTo>
+                  <a:lnTo>
+                    <a:pt x="2475885" y="529675"/>
+                  </a:lnTo>
+                  <a:lnTo>
+                    <a:pt x="2700965" y="585368"/>
+                  </a:lnTo>
+                  <a:lnTo>
+                    <a:pt x="2926046" y="646760"/>
+                  </a:lnTo>
+                  <a:lnTo>
+                    <a:pt x="3151126" y="713749"/>
+                  </a:lnTo>
+                  <a:lnTo>
+                    <a:pt x="3376207" y="784203"/>
+                  </a:lnTo>
+                  <a:lnTo>
+                    <a:pt x="3601287" y="849500"/>
+                  </a:lnTo>
+                  <a:lnTo>
+                    <a:pt x="3826368" y="891039"/>
+                  </a:lnTo>
+                  <a:lnTo>
+                    <a:pt x="4051448" y="913918"/>
+                  </a:lnTo>
+                  <a:lnTo>
+                    <a:pt x="4276529" y="928880"/>
+                  </a:lnTo>
+                  <a:lnTo>
+                    <a:pt x="4501609" y="939649"/>
+                  </a:lnTo>
+                  <a:lnTo>
+                    <a:pt x="4726690" y="947481"/>
+                  </a:lnTo>
+                  <a:lnTo>
+                    <a:pt x="4951770" y="952870"/>
+                  </a:lnTo>
+                  <a:lnTo>
+                    <a:pt x="5176851" y="956031"/>
+                  </a:lnTo>
+                  <a:lnTo>
+                    <a:pt x="5401931" y="957059"/>
+                  </a:lnTo>
+                  <a:lnTo>
+                    <a:pt x="5627012" y="957059"/>
+                  </a:lnTo>
+                  <a:lnTo>
+                    <a:pt x="5852092" y="957059"/>
+                  </a:lnTo>
+                  <a:lnTo>
+                    <a:pt x="5852092" y="1299398"/>
+                  </a:lnTo>
+                  <a:lnTo>
+                    <a:pt x="5627012" y="1299398"/>
+                  </a:lnTo>
+                  <a:lnTo>
+                    <a:pt x="5401931" y="1299398"/>
+                  </a:lnTo>
+                  <a:lnTo>
+                    <a:pt x="5176851" y="1293354"/>
+                  </a:lnTo>
+                  <a:lnTo>
+                    <a:pt x="4951770" y="1275005"/>
+                  </a:lnTo>
+                  <a:lnTo>
+                    <a:pt x="4726690" y="1244603"/>
+                  </a:lnTo>
+                  <a:lnTo>
+                    <a:pt x="4501609" y="1202622"/>
+                  </a:lnTo>
+                  <a:lnTo>
+                    <a:pt x="4276529" y="1149911"/>
+                  </a:lnTo>
+                  <a:lnTo>
+                    <a:pt x="4051448" y="1088161"/>
+                  </a:lnTo>
+                  <a:lnTo>
+                    <a:pt x="3826368" y="1021614"/>
+                  </a:lnTo>
+                  <a:lnTo>
+                    <a:pt x="3601287" y="961586"/>
+                  </a:lnTo>
+                  <a:lnTo>
+                    <a:pt x="3376207" y="917733"/>
+                  </a:lnTo>
+                  <a:lnTo>
+                    <a:pt x="3151126" y="875618"/>
+                  </a:lnTo>
+                  <a:lnTo>
+                    <a:pt x="2926046" y="826472"/>
+                  </a:lnTo>
+                  <a:lnTo>
+                    <a:pt x="2700965" y="768165"/>
+                  </a:lnTo>
+                  <a:lnTo>
+                    <a:pt x="2475885" y="700724"/>
+                  </a:lnTo>
+                  <a:lnTo>
+                    <a:pt x="2250804" y="625591"/>
+                  </a:lnTo>
+                  <a:lnTo>
+                    <a:pt x="2025724" y="547046"/>
+                  </a:lnTo>
+                  <a:lnTo>
+                    <a:pt x="1800643" y="476749"/>
+                  </a:lnTo>
+                  <a:lnTo>
+                    <a:pt x="1575563" y="430278"/>
+                  </a:lnTo>
+                  <a:lnTo>
+                    <a:pt x="1350482" y="399971"/>
+                  </a:lnTo>
+                  <a:lnTo>
+                    <a:pt x="1125402" y="377420"/>
+                  </a:lnTo>
+                  <a:lnTo>
+                    <a:pt x="900321" y="360057"/>
+                  </a:lnTo>
+                  <a:lnTo>
+                    <a:pt x="675241" y="346974"/>
+                  </a:lnTo>
+                  <a:lnTo>
+                    <a:pt x="450160" y="337787"/>
+                  </a:lnTo>
+                  <a:lnTo>
+                    <a:pt x="225080" y="332313"/>
+                  </a:lnTo>
+                  <a:lnTo>
+                    <a:pt x="0" y="330468"/>
                   </a:lnTo>
                   <a:close/>
                 </a:path>
@@ -3959,96 +3959,96 @@
           </p:nvSpPr>
           <p:spPr>
             <a:xfrm>
-              <a:off x="4822518" y="2417475"/>
-              <a:ext cx="5852092" cy="919760"/>
+              <a:off x="4822518" y="2344232"/>
+              <a:ext cx="5852092" cy="957059"/>
             </a:xfrm>
             <a:custGeom>
               <a:avLst/>
               <a:pathLst>
-                <a:path w="5852092" h="919760">
+                <a:path w="5852092" h="957059">
                   <a:moveTo>
                     <a:pt x="0" y="0"/>
                   </a:moveTo>
                   <a:lnTo>
-                    <a:pt x="225080" y="5252"/>
-                  </a:lnTo>
-                  <a:lnTo>
-                    <a:pt x="450160" y="20786"/>
-                  </a:lnTo>
-                  <a:lnTo>
-                    <a:pt x="675241" y="46667"/>
-                  </a:lnTo>
-                  <a:lnTo>
-                    <a:pt x="900321" y="82982"/>
-                  </a:lnTo>
-                  <a:lnTo>
-                    <a:pt x="1125402" y="129770"/>
-                  </a:lnTo>
-                  <a:lnTo>
-                    <a:pt x="1350482" y="186790"/>
-                  </a:lnTo>
-                  <a:lnTo>
-                    <a:pt x="1575563" y="252559"/>
-                  </a:lnTo>
-                  <a:lnTo>
-                    <a:pt x="1800643" y="320600"/>
-                  </a:lnTo>
-                  <a:lnTo>
-                    <a:pt x="2025724" y="378681"/>
-                  </a:lnTo>
-                  <a:lnTo>
-                    <a:pt x="2250804" y="431306"/>
-                  </a:lnTo>
-                  <a:lnTo>
-                    <a:pt x="2475885" y="483989"/>
-                  </a:lnTo>
-                  <a:lnTo>
-                    <a:pt x="2700965" y="538013"/>
-                  </a:lnTo>
-                  <a:lnTo>
-                    <a:pt x="2926046" y="593399"/>
-                  </a:lnTo>
-                  <a:lnTo>
-                    <a:pt x="3151126" y="649467"/>
-                  </a:lnTo>
-                  <a:lnTo>
-                    <a:pt x="3376207" y="704725"/>
-                  </a:lnTo>
-                  <a:lnTo>
-                    <a:pt x="3601287" y="756630"/>
-                  </a:lnTo>
-                  <a:lnTo>
-                    <a:pt x="3826368" y="800165"/>
-                  </a:lnTo>
-                  <a:lnTo>
-                    <a:pt x="4051448" y="834513"/>
-                  </a:lnTo>
-                  <a:lnTo>
-                    <a:pt x="4276529" y="861777"/>
-                  </a:lnTo>
-                  <a:lnTo>
-                    <a:pt x="4501609" y="883186"/>
-                  </a:lnTo>
-                  <a:lnTo>
-                    <a:pt x="4726690" y="899408"/>
-                  </a:lnTo>
-                  <a:lnTo>
-                    <a:pt x="4951770" y="910801"/>
-                  </a:lnTo>
-                  <a:lnTo>
-                    <a:pt x="5176851" y="917554"/>
-                  </a:lnTo>
-                  <a:lnTo>
-                    <a:pt x="5401931" y="919760"/>
-                  </a:lnTo>
-                  <a:lnTo>
-                    <a:pt x="5627012" y="919760"/>
-                  </a:lnTo>
-                  <a:lnTo>
-                    <a:pt x="5852092" y="919760"/>
-                  </a:lnTo>
-                  <a:lnTo>
-                    <a:pt x="5852092" y="919760"/>
+                    <a:pt x="225080" y="6045"/>
+                  </a:lnTo>
+                  <a:lnTo>
+                    <a:pt x="450160" y="23924"/>
+                  </a:lnTo>
+                  <a:lnTo>
+                    <a:pt x="675241" y="53707"/>
+                  </a:lnTo>
+                  <a:lnTo>
+                    <a:pt x="900321" y="95478"/>
+                  </a:lnTo>
+                  <a:lnTo>
+                    <a:pt x="1125402" y="149229"/>
+                  </a:lnTo>
+                  <a:lnTo>
+                    <a:pt x="1350482" y="214558"/>
+                  </a:lnTo>
+                  <a:lnTo>
+                    <a:pt x="1575563" y="289536"/>
+                  </a:lnTo>
+                  <a:lnTo>
+                    <a:pt x="1800643" y="366554"/>
+                  </a:lnTo>
+                  <a:lnTo>
+                    <a:pt x="2025724" y="427854"/>
+                  </a:lnTo>
+                  <a:lnTo>
+                    <a:pt x="2250804" y="478483"/>
+                  </a:lnTo>
+                  <a:lnTo>
+                    <a:pt x="2475885" y="529675"/>
+                  </a:lnTo>
+                  <a:lnTo>
+                    <a:pt x="2700965" y="585368"/>
+                  </a:lnTo>
+                  <a:lnTo>
+                    <a:pt x="2926046" y="646760"/>
+                  </a:lnTo>
+                  <a:lnTo>
+                    <a:pt x="3151126" y="713749"/>
+                  </a:lnTo>
+                  <a:lnTo>
+                    <a:pt x="3376207" y="784203"/>
+                  </a:lnTo>
+                  <a:lnTo>
+                    <a:pt x="3601287" y="849500"/>
+                  </a:lnTo>
+                  <a:lnTo>
+                    <a:pt x="3826368" y="891039"/>
+                  </a:lnTo>
+                  <a:lnTo>
+                    <a:pt x="4051448" y="913918"/>
+                  </a:lnTo>
+                  <a:lnTo>
+                    <a:pt x="4276529" y="928880"/>
+                  </a:lnTo>
+                  <a:lnTo>
+                    <a:pt x="4501609" y="939649"/>
+                  </a:lnTo>
+                  <a:lnTo>
+                    <a:pt x="4726690" y="947481"/>
+                  </a:lnTo>
+                  <a:lnTo>
+                    <a:pt x="4951770" y="952870"/>
+                  </a:lnTo>
+                  <a:lnTo>
+                    <a:pt x="5176851" y="956031"/>
+                  </a:lnTo>
+                  <a:lnTo>
+                    <a:pt x="5401931" y="957059"/>
+                  </a:lnTo>
+                  <a:lnTo>
+                    <a:pt x="5627012" y="957059"/>
+                  </a:lnTo>
+                  <a:lnTo>
+                    <a:pt x="5852092" y="957059"/>
+                  </a:lnTo>
+                  <a:lnTo>
+                    <a:pt x="5852092" y="957059"/>
                   </a:lnTo>
                 </a:path>
               </a:pathLst>
@@ -4068,90 +4068,90 @@
           </p:nvSpPr>
           <p:spPr>
             <a:xfrm>
-              <a:off x="4822518" y="2597276"/>
-              <a:ext cx="5852092" cy="1007942"/>
+              <a:off x="4822518" y="2674701"/>
+              <a:ext cx="5852092" cy="968929"/>
             </a:xfrm>
             <a:custGeom>
               <a:avLst/>
               <a:pathLst>
-                <a:path w="5852092" h="1007942">
+                <a:path w="5852092" h="968929">
                   <a:moveTo>
-                    <a:pt x="5852092" y="1007942"/>
+                    <a:pt x="5852092" y="968929"/>
                   </a:moveTo>
                   <a:lnTo>
-                    <a:pt x="5627012" y="1007942"/>
-                  </a:lnTo>
-                  <a:lnTo>
-                    <a:pt x="5401931" y="1007942"/>
-                  </a:lnTo>
-                  <a:lnTo>
-                    <a:pt x="5176851" y="1003186"/>
-                  </a:lnTo>
-                  <a:lnTo>
-                    <a:pt x="4951770" y="988756"/>
-                  </a:lnTo>
-                  <a:lnTo>
-                    <a:pt x="4726690" y="964858"/>
-                  </a:lnTo>
-                  <a:lnTo>
-                    <a:pt x="4501609" y="931876"/>
-                  </a:lnTo>
-                  <a:lnTo>
-                    <a:pt x="4276529" y="890432"/>
-                  </a:lnTo>
-                  <a:lnTo>
-                    <a:pt x="4051448" y="841525"/>
-                  </a:lnTo>
-                  <a:lnTo>
-                    <a:pt x="3826368" y="786778"/>
-                  </a:lnTo>
-                  <a:lnTo>
-                    <a:pt x="3601287" y="728741"/>
-                  </a:lnTo>
-                  <a:lnTo>
-                    <a:pt x="3376207" y="671115"/>
-                  </a:lnTo>
-                  <a:lnTo>
-                    <a:pt x="3151126" y="613308"/>
-                  </a:lnTo>
-                  <a:lnTo>
-                    <a:pt x="2926046" y="552842"/>
-                  </a:lnTo>
-                  <a:lnTo>
-                    <a:pt x="2700965" y="488335"/>
-                  </a:lnTo>
-                  <a:lnTo>
-                    <a:pt x="2475885" y="419250"/>
-                  </a:lnTo>
-                  <a:lnTo>
-                    <a:pt x="2250804" y="345786"/>
-                  </a:lnTo>
-                  <a:lnTo>
-                    <a:pt x="2025724" y="269429"/>
-                  </a:lnTo>
-                  <a:lnTo>
-                    <a:pt x="1800643" y="195920"/>
-                  </a:lnTo>
-                  <a:lnTo>
-                    <a:pt x="1575563" y="140136"/>
-                  </a:lnTo>
-                  <a:lnTo>
-                    <a:pt x="1350482" y="100052"/>
-                  </a:lnTo>
-                  <a:lnTo>
-                    <a:pt x="1125402" y="68524"/>
-                  </a:lnTo>
-                  <a:lnTo>
-                    <a:pt x="900321" y="43528"/>
-                  </a:lnTo>
-                  <a:lnTo>
-                    <a:pt x="675241" y="24398"/>
-                  </a:lnTo>
-                  <a:lnTo>
-                    <a:pt x="450160" y="10848"/>
-                  </a:lnTo>
-                  <a:lnTo>
-                    <a:pt x="225080" y="2739"/>
+                    <a:pt x="5627012" y="968929"/>
+                  </a:lnTo>
+                  <a:lnTo>
+                    <a:pt x="5401931" y="968929"/>
+                  </a:lnTo>
+                  <a:lnTo>
+                    <a:pt x="5176851" y="962885"/>
+                  </a:lnTo>
+                  <a:lnTo>
+                    <a:pt x="4951770" y="944536"/>
+                  </a:lnTo>
+                  <a:lnTo>
+                    <a:pt x="4726690" y="914134"/>
+                  </a:lnTo>
+                  <a:lnTo>
+                    <a:pt x="4501609" y="872154"/>
+                  </a:lnTo>
+                  <a:lnTo>
+                    <a:pt x="4276529" y="819442"/>
+                  </a:lnTo>
+                  <a:lnTo>
+                    <a:pt x="4051448" y="757692"/>
+                  </a:lnTo>
+                  <a:lnTo>
+                    <a:pt x="3826368" y="691145"/>
+                  </a:lnTo>
+                  <a:lnTo>
+                    <a:pt x="3601287" y="631118"/>
+                  </a:lnTo>
+                  <a:lnTo>
+                    <a:pt x="3376207" y="587264"/>
+                  </a:lnTo>
+                  <a:lnTo>
+                    <a:pt x="3151126" y="545149"/>
+                  </a:lnTo>
+                  <a:lnTo>
+                    <a:pt x="2926046" y="496003"/>
+                  </a:lnTo>
+                  <a:lnTo>
+                    <a:pt x="2700965" y="437696"/>
+                  </a:lnTo>
+                  <a:lnTo>
+                    <a:pt x="2475885" y="370255"/>
+                  </a:lnTo>
+                  <a:lnTo>
+                    <a:pt x="2250804" y="295122"/>
+                  </a:lnTo>
+                  <a:lnTo>
+                    <a:pt x="2025724" y="216577"/>
+                  </a:lnTo>
+                  <a:lnTo>
+                    <a:pt x="1800643" y="146280"/>
+                  </a:lnTo>
+                  <a:lnTo>
+                    <a:pt x="1575563" y="99809"/>
+                  </a:lnTo>
+                  <a:lnTo>
+                    <a:pt x="1350482" y="69502"/>
+                  </a:lnTo>
+                  <a:lnTo>
+                    <a:pt x="1125402" y="46951"/>
+                  </a:lnTo>
+                  <a:lnTo>
+                    <a:pt x="900321" y="29588"/>
+                  </a:lnTo>
+                  <a:lnTo>
+                    <a:pt x="675241" y="16505"/>
+                  </a:lnTo>
+                  <a:lnTo>
+                    <a:pt x="450160" y="7318"/>
+                  </a:lnTo>
+                  <a:lnTo>
+                    <a:pt x="225080" y="1844"/>
                   </a:lnTo>
                   <a:lnTo>
                     <a:pt x="0" y="0"/>
@@ -5517,7 +5517,7 @@
           </p:nvSpPr>
           <p:spPr>
             <a:xfrm>
-              <a:off x="4788644" y="7902299"/>
+              <a:off x="4788644" y="7821054"/>
               <a:ext cx="5885966" cy="0"/>
             </a:xfrm>
             <a:custGeom>
@@ -5560,7 +5560,7 @@
           </p:nvSpPr>
           <p:spPr>
             <a:xfrm>
-              <a:off x="4788644" y="7222762"/>
+              <a:off x="4788644" y="7060272"/>
               <a:ext cx="5885966" cy="0"/>
             </a:xfrm>
             <a:custGeom>
@@ -5603,7 +5603,7 @@
           </p:nvSpPr>
           <p:spPr>
             <a:xfrm>
-              <a:off x="4788644" y="6543225"/>
+              <a:off x="4788644" y="6299490"/>
               <a:ext cx="5885966" cy="0"/>
             </a:xfrm>
             <a:custGeom>
@@ -5640,223 +5640,180 @@
         </p:sp>
         <p:sp>
           <p:nvSpPr>
-            <p:cNvPr id="48" name="pl48"/>
+            <p:cNvPr id="48" name="pg48"/>
             <p:cNvSpPr/>
             <p:nvPr/>
           </p:nvSpPr>
           <p:spPr>
             <a:xfrm>
-              <a:off x="4788644" y="5863688"/>
-              <a:ext cx="5885966" cy="0"/>
+              <a:off x="4788644" y="5658290"/>
+              <a:ext cx="5885966" cy="2788503"/>
             </a:xfrm>
             <a:custGeom>
               <a:avLst/>
               <a:pathLst>
-                <a:path w="5885966" h="0">
+                <a:path w="5885966" h="2788503">
                   <a:moveTo>
                     <a:pt x="0" y="0"/>
                   </a:moveTo>
                   <a:lnTo>
-                    <a:pt x="5885966" y="0"/>
-                  </a:lnTo>
-                  <a:lnTo>
-                    <a:pt x="5885966" y="0"/>
-                  </a:lnTo>
-                </a:path>
-              </a:pathLst>
-            </a:custGeom>
-            <a:ln w="13550" cap="flat">
-              <a:solidFill>
-                <a:srgbClr val="D8D8D8">
-                  <a:alpha val="100000"/>
-                </a:srgbClr>
-              </a:solidFill>
-              <a:prstDash val="solid"/>
-              <a:round/>
-            </a:ln>
-          </p:spPr>
-          <p:txBody>
-            <a:bodyPr/>
-            <a:lstStyle/>
-            <a:p/>
-          </p:txBody>
-        </p:sp>
-        <p:sp>
-          <p:nvSpPr>
-            <p:cNvPr id="49" name="pg49"/>
-            <p:cNvSpPr/>
-            <p:nvPr/>
-          </p:nvSpPr>
-          <p:spPr>
-            <a:xfrm>
-              <a:off x="4788644" y="5658289"/>
-              <a:ext cx="5885966" cy="2758497"/>
-            </a:xfrm>
-            <a:custGeom>
-              <a:avLst/>
-              <a:pathLst>
-                <a:path w="5885966" h="2758497">
-                  <a:moveTo>
-                    <a:pt x="0" y="0"/>
-                  </a:moveTo>
-                  <a:lnTo>
-                    <a:pt x="226383" y="26534"/>
-                  </a:lnTo>
-                  <a:lnTo>
-                    <a:pt x="452766" y="104095"/>
-                  </a:lnTo>
-                  <a:lnTo>
-                    <a:pt x="679149" y="230285"/>
-                  </a:lnTo>
-                  <a:lnTo>
-                    <a:pt x="905533" y="400946"/>
-                  </a:lnTo>
-                  <a:lnTo>
-                    <a:pt x="1131916" y="609571"/>
-                  </a:lnTo>
-                  <a:lnTo>
-                    <a:pt x="1358299" y="845077"/>
-                  </a:lnTo>
-                  <a:lnTo>
-                    <a:pt x="1584683" y="1083232"/>
-                  </a:lnTo>
-                  <a:lnTo>
-                    <a:pt x="1811066" y="1269269"/>
-                  </a:lnTo>
-                  <a:lnTo>
-                    <a:pt x="2037449" y="1370913"/>
-                  </a:lnTo>
-                  <a:lnTo>
-                    <a:pt x="2263833" y="1441710"/>
-                  </a:lnTo>
-                  <a:lnTo>
-                    <a:pt x="2490216" y="1508941"/>
-                  </a:lnTo>
-                  <a:lnTo>
-                    <a:pt x="2716599" y="1578481"/>
-                  </a:lnTo>
-                  <a:lnTo>
-                    <a:pt x="2942983" y="1649760"/>
-                  </a:lnTo>
-                  <a:lnTo>
-                    <a:pt x="3169366" y="1718151"/>
-                  </a:lnTo>
-                  <a:lnTo>
-                    <a:pt x="3395749" y="1773470"/>
-                  </a:lnTo>
-                  <a:lnTo>
-                    <a:pt x="3622132" y="1796572"/>
-                  </a:lnTo>
-                  <a:lnTo>
-                    <a:pt x="3848516" y="1773462"/>
-                  </a:lnTo>
-                  <a:lnTo>
-                    <a:pt x="4074899" y="1723879"/>
-                  </a:lnTo>
-                  <a:lnTo>
-                    <a:pt x="4301282" y="1666389"/>
-                  </a:lnTo>
-                  <a:lnTo>
-                    <a:pt x="4527666" y="1611644"/>
-                  </a:lnTo>
-                  <a:lnTo>
-                    <a:pt x="4754049" y="1565354"/>
-                  </a:lnTo>
-                  <a:lnTo>
-                    <a:pt x="4980432" y="1530661"/>
-                  </a:lnTo>
-                  <a:lnTo>
-                    <a:pt x="5206816" y="1509319"/>
-                  </a:lnTo>
-                  <a:lnTo>
-                    <a:pt x="5433199" y="1502228"/>
-                  </a:lnTo>
-                  <a:lnTo>
-                    <a:pt x="5659582" y="1502228"/>
-                  </a:lnTo>
-                  <a:lnTo>
-                    <a:pt x="5885966" y="1502228"/>
-                  </a:lnTo>
-                  <a:lnTo>
-                    <a:pt x="5885966" y="2758497"/>
-                  </a:lnTo>
-                  <a:lnTo>
-                    <a:pt x="5659582" y="2758497"/>
-                  </a:lnTo>
-                  <a:lnTo>
-                    <a:pt x="5433199" y="2758497"/>
-                  </a:lnTo>
-                  <a:lnTo>
-                    <a:pt x="5206816" y="2752625"/>
-                  </a:lnTo>
-                  <a:lnTo>
-                    <a:pt x="4980432" y="2734822"/>
-                  </a:lnTo>
-                  <a:lnTo>
-                    <a:pt x="4754049" y="2705451"/>
-                  </a:lnTo>
-                  <a:lnTo>
-                    <a:pt x="4527666" y="2665363"/>
-                  </a:lnTo>
-                  <a:lnTo>
-                    <a:pt x="4301282" y="2616437"/>
-                  </a:lnTo>
-                  <a:lnTo>
-                    <a:pt x="4074899" y="2562753"/>
-                  </a:lnTo>
-                  <a:lnTo>
-                    <a:pt x="3848516" y="2512966"/>
-                  </a:lnTo>
-                  <a:lnTo>
-                    <a:pt x="3622132" y="2483271"/>
-                  </a:lnTo>
-                  <a:lnTo>
-                    <a:pt x="3395749" y="2475634"/>
-                  </a:lnTo>
-                  <a:lnTo>
-                    <a:pt x="3169366" y="2461587"/>
-                  </a:lnTo>
-                  <a:lnTo>
-                    <a:pt x="2942983" y="2424181"/>
-                  </a:lnTo>
-                  <a:lnTo>
-                    <a:pt x="2716599" y="2353768"/>
-                  </a:lnTo>
-                  <a:lnTo>
-                    <a:pt x="2490216" y="2244573"/>
-                  </a:lnTo>
-                  <a:lnTo>
-                    <a:pt x="2263833" y="2093072"/>
-                  </a:lnTo>
-                  <a:lnTo>
-                    <a:pt x="2037449" y="1900160"/>
-                  </a:lnTo>
-                  <a:lnTo>
-                    <a:pt x="1811066" y="1685779"/>
-                  </a:lnTo>
-                  <a:lnTo>
-                    <a:pt x="1584683" y="1537221"/>
-                  </a:lnTo>
-                  <a:lnTo>
-                    <a:pt x="1358299" y="1468642"/>
-                  </a:lnTo>
-                  <a:lnTo>
-                    <a:pt x="1131916" y="1431738"/>
-                  </a:lnTo>
-                  <a:lnTo>
-                    <a:pt x="905533" y="1408239"/>
-                  </a:lnTo>
-                  <a:lnTo>
-                    <a:pt x="679149" y="1392311"/>
-                  </a:lnTo>
-                  <a:lnTo>
-                    <a:pt x="452766" y="1381769"/>
-                  </a:lnTo>
-                  <a:lnTo>
-                    <a:pt x="226383" y="1375689"/>
-                  </a:lnTo>
-                  <a:lnTo>
-                    <a:pt x="0" y="1373668"/>
+                    <a:pt x="226383" y="27991"/>
+                  </a:lnTo>
+                  <a:lnTo>
+                    <a:pt x="452766" y="109759"/>
+                  </a:lnTo>
+                  <a:lnTo>
+                    <a:pt x="679149" y="242645"/>
+                  </a:lnTo>
+                  <a:lnTo>
+                    <a:pt x="905533" y="422173"/>
+                  </a:lnTo>
+                  <a:lnTo>
+                    <a:pt x="1131916" y="641760"/>
+                  </a:lnTo>
+                  <a:lnTo>
+                    <a:pt x="1358299" y="891539"/>
+                  </a:lnTo>
+                  <a:lnTo>
+                    <a:pt x="1584683" y="1153669"/>
+                  </a:lnTo>
+                  <a:lnTo>
+                    <a:pt x="1811066" y="1385629"/>
+                  </a:lnTo>
+                  <a:lnTo>
+                    <a:pt x="2037449" y="1516954"/>
+                  </a:lnTo>
+                  <a:lnTo>
+                    <a:pt x="2263833" y="1588619"/>
+                  </a:lnTo>
+                  <a:lnTo>
+                    <a:pt x="2490216" y="1651971"/>
+                  </a:lnTo>
+                  <a:lnTo>
+                    <a:pt x="2716599" y="1722713"/>
+                  </a:lnTo>
+                  <a:lnTo>
+                    <a:pt x="2942983" y="1804176"/>
+                  </a:lnTo>
+                  <a:lnTo>
+                    <a:pt x="3169366" y="1893937"/>
+                  </a:lnTo>
+                  <a:lnTo>
+                    <a:pt x="3395749" y="1981419"/>
+                  </a:lnTo>
+                  <a:lnTo>
+                    <a:pt x="3622132" y="2032399"/>
+                  </a:lnTo>
+                  <a:lnTo>
+                    <a:pt x="3848516" y="2000422"/>
+                  </a:lnTo>
+                  <a:lnTo>
+                    <a:pt x="4074899" y="1925206"/>
+                  </a:lnTo>
+                  <a:lnTo>
+                    <a:pt x="4301282" y="1844498"/>
+                  </a:lnTo>
+                  <a:lnTo>
+                    <a:pt x="4527666" y="1771793"/>
+                  </a:lnTo>
+                  <a:lnTo>
+                    <a:pt x="4754049" y="1712322"/>
+                  </a:lnTo>
+                  <a:lnTo>
+                    <a:pt x="4980432" y="1668600"/>
+                  </a:lnTo>
+                  <a:lnTo>
+                    <a:pt x="5206816" y="1641987"/>
+                  </a:lnTo>
+                  <a:lnTo>
+                    <a:pt x="5433199" y="1633186"/>
+                  </a:lnTo>
+                  <a:lnTo>
+                    <a:pt x="5659582" y="1633186"/>
+                  </a:lnTo>
+                  <a:lnTo>
+                    <a:pt x="5885966" y="1633186"/>
+                  </a:lnTo>
+                  <a:lnTo>
+                    <a:pt x="5885966" y="2788503"/>
+                  </a:lnTo>
+                  <a:lnTo>
+                    <a:pt x="5659582" y="2788503"/>
+                  </a:lnTo>
+                  <a:lnTo>
+                    <a:pt x="5433199" y="2788503"/>
+                  </a:lnTo>
+                  <a:lnTo>
+                    <a:pt x="5206816" y="2781480"/>
+                  </a:lnTo>
+                  <a:lnTo>
+                    <a:pt x="4980432" y="2760055"/>
+                  </a:lnTo>
+                  <a:lnTo>
+                    <a:pt x="4754049" y="2724222"/>
+                  </a:lnTo>
+                  <a:lnTo>
+                    <a:pt x="4527666" y="2674157"/>
+                  </a:lnTo>
+                  <a:lnTo>
+                    <a:pt x="4301282" y="2610713"/>
+                  </a:lnTo>
+                  <a:lnTo>
+                    <a:pt x="4074899" y="2536983"/>
+                  </a:lnTo>
+                  <a:lnTo>
+                    <a:pt x="3848516" y="2463840"/>
+                  </a:lnTo>
+                  <a:lnTo>
+                    <a:pt x="3622132" y="2425919"/>
+                  </a:lnTo>
+                  <a:lnTo>
+                    <a:pt x="3395749" y="2446374"/>
+                  </a:lnTo>
+                  <a:lnTo>
+                    <a:pt x="3169366" y="2467353"/>
+                  </a:lnTo>
+                  <a:lnTo>
+                    <a:pt x="2942983" y="2458268"/>
+                  </a:lnTo>
+                  <a:lnTo>
+                    <a:pt x="2716599" y="2409984"/>
+                  </a:lnTo>
+                  <a:lnTo>
+                    <a:pt x="2490216" y="2319308"/>
+                  </a:lnTo>
+                  <a:lnTo>
+                    <a:pt x="2263833" y="2186415"/>
+                  </a:lnTo>
+                  <a:lnTo>
+                    <a:pt x="2037449" y="2021173"/>
+                  </a:lnTo>
+                  <a:lnTo>
+                    <a:pt x="1811066" y="1865938"/>
+                  </a:lnTo>
+                  <a:lnTo>
+                    <a:pt x="1584683" y="1790145"/>
+                  </a:lnTo>
+                  <a:lnTo>
+                    <a:pt x="1358299" y="1766417"/>
+                  </a:lnTo>
+                  <a:lnTo>
+                    <a:pt x="1131916" y="1759525"/>
+                  </a:lnTo>
+                  <a:lnTo>
+                    <a:pt x="905533" y="1758435"/>
+                  </a:lnTo>
+                  <a:lnTo>
+                    <a:pt x="679149" y="1759320"/>
+                  </a:lnTo>
+                  <a:lnTo>
+                    <a:pt x="452766" y="1760616"/>
+                  </a:lnTo>
+                  <a:lnTo>
+                    <a:pt x="226383" y="1761607"/>
+                  </a:lnTo>
+                  <a:lnTo>
+                    <a:pt x="0" y="1761975"/>
                   </a:lnTo>
                   <a:close/>
                 </a:path>
@@ -5876,105 +5833,214 @@
         </p:sp>
         <p:sp>
           <p:nvSpPr>
+            <p:cNvPr id="49" name="pl49"/>
+            <p:cNvSpPr/>
+            <p:nvPr/>
+          </p:nvSpPr>
+          <p:spPr>
+            <a:xfrm>
+              <a:off x="4788644" y="5658290"/>
+              <a:ext cx="5885966" cy="2032399"/>
+            </a:xfrm>
+            <a:custGeom>
+              <a:avLst/>
+              <a:pathLst>
+                <a:path w="5885966" h="2032399">
+                  <a:moveTo>
+                    <a:pt x="0" y="0"/>
+                  </a:moveTo>
+                  <a:lnTo>
+                    <a:pt x="0" y="0"/>
+                  </a:lnTo>
+                  <a:lnTo>
+                    <a:pt x="226383" y="27991"/>
+                  </a:lnTo>
+                  <a:lnTo>
+                    <a:pt x="452766" y="109759"/>
+                  </a:lnTo>
+                  <a:lnTo>
+                    <a:pt x="679149" y="242645"/>
+                  </a:lnTo>
+                  <a:lnTo>
+                    <a:pt x="905533" y="422173"/>
+                  </a:lnTo>
+                  <a:lnTo>
+                    <a:pt x="1131916" y="641760"/>
+                  </a:lnTo>
+                  <a:lnTo>
+                    <a:pt x="1358299" y="891539"/>
+                  </a:lnTo>
+                  <a:lnTo>
+                    <a:pt x="1584683" y="1153669"/>
+                  </a:lnTo>
+                  <a:lnTo>
+                    <a:pt x="1811066" y="1385629"/>
+                  </a:lnTo>
+                  <a:lnTo>
+                    <a:pt x="2037449" y="1516954"/>
+                  </a:lnTo>
+                  <a:lnTo>
+                    <a:pt x="2263833" y="1588619"/>
+                  </a:lnTo>
+                  <a:lnTo>
+                    <a:pt x="2490216" y="1651971"/>
+                  </a:lnTo>
+                  <a:lnTo>
+                    <a:pt x="2716599" y="1722713"/>
+                  </a:lnTo>
+                  <a:lnTo>
+                    <a:pt x="2942983" y="1804176"/>
+                  </a:lnTo>
+                  <a:lnTo>
+                    <a:pt x="3169366" y="1893937"/>
+                  </a:lnTo>
+                  <a:lnTo>
+                    <a:pt x="3395749" y="1981419"/>
+                  </a:lnTo>
+                  <a:lnTo>
+                    <a:pt x="3622132" y="2032399"/>
+                  </a:lnTo>
+                  <a:lnTo>
+                    <a:pt x="3848516" y="2000422"/>
+                  </a:lnTo>
+                  <a:lnTo>
+                    <a:pt x="4074899" y="1925206"/>
+                  </a:lnTo>
+                  <a:lnTo>
+                    <a:pt x="4301282" y="1844498"/>
+                  </a:lnTo>
+                  <a:lnTo>
+                    <a:pt x="4527666" y="1771793"/>
+                  </a:lnTo>
+                  <a:lnTo>
+                    <a:pt x="4754049" y="1712322"/>
+                  </a:lnTo>
+                  <a:lnTo>
+                    <a:pt x="4980432" y="1668600"/>
+                  </a:lnTo>
+                  <a:lnTo>
+                    <a:pt x="5206816" y="1641987"/>
+                  </a:lnTo>
+                  <a:lnTo>
+                    <a:pt x="5433199" y="1633186"/>
+                  </a:lnTo>
+                  <a:lnTo>
+                    <a:pt x="5659582" y="1633186"/>
+                  </a:lnTo>
+                  <a:lnTo>
+                    <a:pt x="5885966" y="1633186"/>
+                  </a:lnTo>
+                  <a:lnTo>
+                    <a:pt x="5885966" y="1633186"/>
+                  </a:lnTo>
+                </a:path>
+              </a:pathLst>
+            </a:custGeom>
+          </p:spPr>
+          <p:txBody>
+            <a:bodyPr/>
+            <a:lstStyle/>
+            <a:p/>
+          </p:txBody>
+        </p:sp>
+        <p:sp>
+          <p:nvSpPr>
             <p:cNvPr id="50" name="pl50"/>
             <p:cNvSpPr/>
             <p:nvPr/>
           </p:nvSpPr>
           <p:spPr>
             <a:xfrm>
-              <a:off x="4788644" y="5658289"/>
-              <a:ext cx="5885966" cy="1796572"/>
+              <a:off x="4788644" y="7416725"/>
+              <a:ext cx="5885966" cy="1030068"/>
             </a:xfrm>
             <a:custGeom>
               <a:avLst/>
               <a:pathLst>
-                <a:path w="5885966" h="1796572">
+                <a:path w="5885966" h="1030068">
                   <a:moveTo>
-                    <a:pt x="0" y="0"/>
+                    <a:pt x="5885966" y="1030068"/>
                   </a:moveTo>
                   <a:lnTo>
-                    <a:pt x="0" y="0"/>
-                  </a:lnTo>
-                  <a:lnTo>
-                    <a:pt x="226383" y="26534"/>
-                  </a:lnTo>
-                  <a:lnTo>
-                    <a:pt x="452766" y="104095"/>
-                  </a:lnTo>
-                  <a:lnTo>
-                    <a:pt x="679149" y="230285"/>
-                  </a:lnTo>
-                  <a:lnTo>
-                    <a:pt x="905533" y="400946"/>
-                  </a:lnTo>
-                  <a:lnTo>
-                    <a:pt x="1131916" y="609571"/>
-                  </a:lnTo>
-                  <a:lnTo>
-                    <a:pt x="1358299" y="845077"/>
-                  </a:lnTo>
-                  <a:lnTo>
-                    <a:pt x="1584683" y="1083232"/>
-                  </a:lnTo>
-                  <a:lnTo>
-                    <a:pt x="1811066" y="1269269"/>
-                  </a:lnTo>
-                  <a:lnTo>
-                    <a:pt x="2037449" y="1370913"/>
-                  </a:lnTo>
-                  <a:lnTo>
-                    <a:pt x="2263833" y="1441710"/>
-                  </a:lnTo>
-                  <a:lnTo>
-                    <a:pt x="2490216" y="1508941"/>
-                  </a:lnTo>
-                  <a:lnTo>
-                    <a:pt x="2716599" y="1578481"/>
-                  </a:lnTo>
-                  <a:lnTo>
-                    <a:pt x="2942983" y="1649760"/>
-                  </a:lnTo>
-                  <a:lnTo>
-                    <a:pt x="3169366" y="1718151"/>
-                  </a:lnTo>
-                  <a:lnTo>
-                    <a:pt x="3395749" y="1773470"/>
-                  </a:lnTo>
-                  <a:lnTo>
-                    <a:pt x="3622132" y="1796572"/>
-                  </a:lnTo>
-                  <a:lnTo>
-                    <a:pt x="3848516" y="1773462"/>
-                  </a:lnTo>
-                  <a:lnTo>
-                    <a:pt x="4074899" y="1723879"/>
-                  </a:lnTo>
-                  <a:lnTo>
-                    <a:pt x="4301282" y="1666389"/>
-                  </a:lnTo>
-                  <a:lnTo>
-                    <a:pt x="4527666" y="1611644"/>
-                  </a:lnTo>
-                  <a:lnTo>
-                    <a:pt x="4754049" y="1565354"/>
-                  </a:lnTo>
-                  <a:lnTo>
-                    <a:pt x="4980432" y="1530661"/>
-                  </a:lnTo>
-                  <a:lnTo>
-                    <a:pt x="5206816" y="1509319"/>
-                  </a:lnTo>
-                  <a:lnTo>
-                    <a:pt x="5433199" y="1502228"/>
-                  </a:lnTo>
-                  <a:lnTo>
-                    <a:pt x="5659582" y="1502228"/>
-                  </a:lnTo>
-                  <a:lnTo>
-                    <a:pt x="5885966" y="1502228"/>
-                  </a:lnTo>
-                  <a:lnTo>
-                    <a:pt x="5885966" y="1502228"/>
+                    <a:pt x="5659582" y="1030068"/>
+                  </a:lnTo>
+                  <a:lnTo>
+                    <a:pt x="5433199" y="1030068"/>
+                  </a:lnTo>
+                  <a:lnTo>
+                    <a:pt x="5206816" y="1023045"/>
+                  </a:lnTo>
+                  <a:lnTo>
+                    <a:pt x="4980432" y="1001620"/>
+                  </a:lnTo>
+                  <a:lnTo>
+                    <a:pt x="4754049" y="965787"/>
+                  </a:lnTo>
+                  <a:lnTo>
+                    <a:pt x="4527666" y="915722"/>
+                  </a:lnTo>
+                  <a:lnTo>
+                    <a:pt x="4301282" y="852278"/>
+                  </a:lnTo>
+                  <a:lnTo>
+                    <a:pt x="4074899" y="778548"/>
+                  </a:lnTo>
+                  <a:lnTo>
+                    <a:pt x="3848516" y="705405"/>
+                  </a:lnTo>
+                  <a:lnTo>
+                    <a:pt x="3622132" y="667484"/>
+                  </a:lnTo>
+                  <a:lnTo>
+                    <a:pt x="3395749" y="687939"/>
+                  </a:lnTo>
+                  <a:lnTo>
+                    <a:pt x="3169366" y="708918"/>
+                  </a:lnTo>
+                  <a:lnTo>
+                    <a:pt x="2942983" y="699833"/>
+                  </a:lnTo>
+                  <a:lnTo>
+                    <a:pt x="2716599" y="651549"/>
+                  </a:lnTo>
+                  <a:lnTo>
+                    <a:pt x="2490216" y="560873"/>
+                  </a:lnTo>
+                  <a:lnTo>
+                    <a:pt x="2263833" y="427980"/>
+                  </a:lnTo>
+                  <a:lnTo>
+                    <a:pt x="2037449" y="262738"/>
+                  </a:lnTo>
+                  <a:lnTo>
+                    <a:pt x="1811066" y="107503"/>
+                  </a:lnTo>
+                  <a:lnTo>
+                    <a:pt x="1584683" y="31710"/>
+                  </a:lnTo>
+                  <a:lnTo>
+                    <a:pt x="1358299" y="7982"/>
+                  </a:lnTo>
+                  <a:lnTo>
+                    <a:pt x="1131916" y="1090"/>
+                  </a:lnTo>
+                  <a:lnTo>
+                    <a:pt x="905533" y="0"/>
+                  </a:lnTo>
+                  <a:lnTo>
+                    <a:pt x="679149" y="885"/>
+                  </a:lnTo>
+                  <a:lnTo>
+                    <a:pt x="452766" y="2180"/>
+                  </a:lnTo>
+                  <a:lnTo>
+                    <a:pt x="226383" y="3172"/>
+                  </a:lnTo>
+                  <a:lnTo>
+                    <a:pt x="0" y="3539"/>
+                  </a:lnTo>
+                  <a:lnTo>
+                    <a:pt x="0" y="3539"/>
                   </a:lnTo>
                 </a:path>
               </a:pathLst>
@@ -5994,122 +6060,13 @@
           </p:nvSpPr>
           <p:spPr>
             <a:xfrm>
-              <a:off x="4788644" y="7031958"/>
-              <a:ext cx="5885966" cy="1384828"/>
+              <a:off x="4788644" y="6616165"/>
+              <a:ext cx="5885966" cy="1297658"/>
             </a:xfrm>
             <a:custGeom>
               <a:avLst/>
               <a:pathLst>
-                <a:path w="5885966" h="1384828">
-                  <a:moveTo>
-                    <a:pt x="5885966" y="1384828"/>
-                  </a:moveTo>
-                  <a:lnTo>
-                    <a:pt x="5659582" y="1384828"/>
-                  </a:lnTo>
-                  <a:lnTo>
-                    <a:pt x="5433199" y="1384828"/>
-                  </a:lnTo>
-                  <a:lnTo>
-                    <a:pt x="5206816" y="1378956"/>
-                  </a:lnTo>
-                  <a:lnTo>
-                    <a:pt x="4980432" y="1361154"/>
-                  </a:lnTo>
-                  <a:lnTo>
-                    <a:pt x="4754049" y="1331782"/>
-                  </a:lnTo>
-                  <a:lnTo>
-                    <a:pt x="4527666" y="1291694"/>
-                  </a:lnTo>
-                  <a:lnTo>
-                    <a:pt x="4301282" y="1242768"/>
-                  </a:lnTo>
-                  <a:lnTo>
-                    <a:pt x="4074899" y="1189084"/>
-                  </a:lnTo>
-                  <a:lnTo>
-                    <a:pt x="3848516" y="1139298"/>
-                  </a:lnTo>
-                  <a:lnTo>
-                    <a:pt x="3622132" y="1109603"/>
-                  </a:lnTo>
-                  <a:lnTo>
-                    <a:pt x="3395749" y="1101965"/>
-                  </a:lnTo>
-                  <a:lnTo>
-                    <a:pt x="3169366" y="1087919"/>
-                  </a:lnTo>
-                  <a:lnTo>
-                    <a:pt x="2942983" y="1050512"/>
-                  </a:lnTo>
-                  <a:lnTo>
-                    <a:pt x="2716599" y="980100"/>
-                  </a:lnTo>
-                  <a:lnTo>
-                    <a:pt x="2490216" y="870905"/>
-                  </a:lnTo>
-                  <a:lnTo>
-                    <a:pt x="2263833" y="719404"/>
-                  </a:lnTo>
-                  <a:lnTo>
-                    <a:pt x="2037449" y="526492"/>
-                  </a:lnTo>
-                  <a:lnTo>
-                    <a:pt x="1811066" y="312111"/>
-                  </a:lnTo>
-                  <a:lnTo>
-                    <a:pt x="1584683" y="163552"/>
-                  </a:lnTo>
-                  <a:lnTo>
-                    <a:pt x="1358299" y="94974"/>
-                  </a:lnTo>
-                  <a:lnTo>
-                    <a:pt x="1131916" y="58069"/>
-                  </a:lnTo>
-                  <a:lnTo>
-                    <a:pt x="905533" y="34571"/>
-                  </a:lnTo>
-                  <a:lnTo>
-                    <a:pt x="679149" y="18642"/>
-                  </a:lnTo>
-                  <a:lnTo>
-                    <a:pt x="452766" y="8101"/>
-                  </a:lnTo>
-                  <a:lnTo>
-                    <a:pt x="226383" y="2020"/>
-                  </a:lnTo>
-                  <a:lnTo>
-                    <a:pt x="0" y="0"/>
-                  </a:lnTo>
-                  <a:lnTo>
-                    <a:pt x="0" y="0"/>
-                  </a:lnTo>
-                </a:path>
-              </a:pathLst>
-            </a:custGeom>
-          </p:spPr>
-          <p:txBody>
-            <a:bodyPr/>
-            <a:lstStyle/>
-            <a:p/>
-          </p:txBody>
-        </p:sp>
-        <p:sp>
-          <p:nvSpPr>
-            <p:cNvPr id="52" name="pl52"/>
-            <p:cNvSpPr/>
-            <p:nvPr/>
-          </p:nvSpPr>
-          <p:spPr>
-            <a:xfrm>
-              <a:off x="4788644" y="6387143"/>
-              <a:ext cx="5885966" cy="1448849"/>
-            </a:xfrm>
-            <a:custGeom>
-              <a:avLst/>
-              <a:pathLst>
-                <a:path w="5885966" h="1448849">
+                <a:path w="5885966" h="1297658">
                   <a:moveTo>
                     <a:pt x="0" y="0"/>
                   </a:moveTo>
@@ -6117,85 +6074,85 @@
                     <a:pt x="0" y="0"/>
                   </a:lnTo>
                   <a:lnTo>
-                    <a:pt x="226383" y="12889"/>
-                  </a:lnTo>
-                  <a:lnTo>
-                    <a:pt x="452766" y="50780"/>
-                  </a:lnTo>
-                  <a:lnTo>
-                    <a:pt x="679149" y="113163"/>
-                  </a:lnTo>
-                  <a:lnTo>
-                    <a:pt x="905533" y="199205"/>
-                  </a:lnTo>
-                  <a:lnTo>
-                    <a:pt x="1131916" y="307766"/>
-                  </a:lnTo>
-                  <a:lnTo>
-                    <a:pt x="1358299" y="437426"/>
-                  </a:lnTo>
-                  <a:lnTo>
-                    <a:pt x="1584683" y="586517"/>
-                  </a:lnTo>
-                  <a:lnTo>
-                    <a:pt x="1811066" y="753150"/>
-                  </a:lnTo>
-                  <a:lnTo>
-                    <a:pt x="2037449" y="914161"/>
-                  </a:lnTo>
-                  <a:lnTo>
-                    <a:pt x="2263833" y="1050198"/>
-                  </a:lnTo>
-                  <a:lnTo>
-                    <a:pt x="2490216" y="1163150"/>
-                  </a:lnTo>
-                  <a:lnTo>
-                    <a:pt x="2716599" y="1254557"/>
-                  </a:lnTo>
-                  <a:lnTo>
-                    <a:pt x="2942983" y="1325651"/>
-                  </a:lnTo>
-                  <a:lnTo>
-                    <a:pt x="3169366" y="1377374"/>
-                  </a:lnTo>
-                  <a:lnTo>
-                    <a:pt x="3395749" y="1410409"/>
-                  </a:lnTo>
-                  <a:lnTo>
-                    <a:pt x="3622132" y="1425189"/>
-                  </a:lnTo>
-                  <a:lnTo>
-                    <a:pt x="3848516" y="1430754"/>
-                  </a:lnTo>
-                  <a:lnTo>
-                    <a:pt x="4074899" y="1435570"/>
-                  </a:lnTo>
-                  <a:lnTo>
-                    <a:pt x="4301282" y="1439639"/>
-                  </a:lnTo>
-                  <a:lnTo>
-                    <a:pt x="4527666" y="1442964"/>
-                  </a:lnTo>
-                  <a:lnTo>
-                    <a:pt x="4754049" y="1445546"/>
-                  </a:lnTo>
-                  <a:lnTo>
-                    <a:pt x="4980432" y="1447387"/>
-                  </a:lnTo>
-                  <a:lnTo>
-                    <a:pt x="5206816" y="1448488"/>
-                  </a:lnTo>
-                  <a:lnTo>
-                    <a:pt x="5433199" y="1448849"/>
-                  </a:lnTo>
-                  <a:lnTo>
-                    <a:pt x="5659582" y="1448849"/>
-                  </a:lnTo>
-                  <a:lnTo>
-                    <a:pt x="5885966" y="1448849"/>
-                  </a:lnTo>
-                  <a:lnTo>
-                    <a:pt x="5885966" y="1448849"/>
+                    <a:pt x="226383" y="11544"/>
+                  </a:lnTo>
+                  <a:lnTo>
+                    <a:pt x="452766" y="45481"/>
+                  </a:lnTo>
+                  <a:lnTo>
+                    <a:pt x="679149" y="101354"/>
+                  </a:lnTo>
+                  <a:lnTo>
+                    <a:pt x="905533" y="178417"/>
+                  </a:lnTo>
+                  <a:lnTo>
+                    <a:pt x="1131916" y="275649"/>
+                  </a:lnTo>
+                  <a:lnTo>
+                    <a:pt x="1358299" y="391780"/>
+                  </a:lnTo>
+                  <a:lnTo>
+                    <a:pt x="1584683" y="525312"/>
+                  </a:lnTo>
+                  <a:lnTo>
+                    <a:pt x="1811066" y="674557"/>
+                  </a:lnTo>
+                  <a:lnTo>
+                    <a:pt x="2037449" y="818766"/>
+                  </a:lnTo>
+                  <a:lnTo>
+                    <a:pt x="2263833" y="940607"/>
+                  </a:lnTo>
+                  <a:lnTo>
+                    <a:pt x="2490216" y="1041772"/>
+                  </a:lnTo>
+                  <a:lnTo>
+                    <a:pt x="2716599" y="1123641"/>
+                  </a:lnTo>
+                  <a:lnTo>
+                    <a:pt x="2942983" y="1187316"/>
+                  </a:lnTo>
+                  <a:lnTo>
+                    <a:pt x="3169366" y="1233642"/>
+                  </a:lnTo>
+                  <a:lnTo>
+                    <a:pt x="3395749" y="1263229"/>
+                  </a:lnTo>
+                  <a:lnTo>
+                    <a:pt x="3622132" y="1276467"/>
+                  </a:lnTo>
+                  <a:lnTo>
+                    <a:pt x="3848516" y="1281451"/>
+                  </a:lnTo>
+                  <a:lnTo>
+                    <a:pt x="4074899" y="1285765"/>
+                  </a:lnTo>
+                  <a:lnTo>
+                    <a:pt x="4301282" y="1289409"/>
+                  </a:lnTo>
+                  <a:lnTo>
+                    <a:pt x="4527666" y="1292387"/>
+                  </a:lnTo>
+                  <a:lnTo>
+                    <a:pt x="4754049" y="1294700"/>
+                  </a:lnTo>
+                  <a:lnTo>
+                    <a:pt x="4980432" y="1296349"/>
+                  </a:lnTo>
+                  <a:lnTo>
+                    <a:pt x="5206816" y="1297335"/>
+                  </a:lnTo>
+                  <a:lnTo>
+                    <a:pt x="5433199" y="1297658"/>
+                  </a:lnTo>
+                  <a:lnTo>
+                    <a:pt x="5659582" y="1297658"/>
+                  </a:lnTo>
+                  <a:lnTo>
+                    <a:pt x="5885966" y="1297658"/>
+                  </a:lnTo>
+                  <a:lnTo>
+                    <a:pt x="5885966" y="1297658"/>
                   </a:lnTo>
                 </a:path>
               </a:pathLst>
@@ -6218,7 +6175,7 @@
         </p:sp>
         <p:sp>
           <p:nvSpPr>
-            <p:cNvPr id="53" name="pl53"/>
+            <p:cNvPr id="52" name="pl52"/>
             <p:cNvSpPr/>
             <p:nvPr/>
           </p:nvSpPr>
@@ -6261,7 +6218,7 @@
         </p:sp>
         <p:sp>
           <p:nvSpPr>
-            <p:cNvPr id="54" name="tx54"/>
+            <p:cNvPr id="53" name="tx53"/>
             <p:cNvSpPr/>
             <p:nvPr/>
           </p:nvSpPr>
@@ -6307,13 +6264,13 @@
         </p:sp>
         <p:sp>
           <p:nvSpPr>
-            <p:cNvPr id="55" name="tx55"/>
+            <p:cNvPr id="54" name="tx54"/>
             <p:cNvSpPr/>
             <p:nvPr/>
           </p:nvSpPr>
           <p:spPr>
             <a:xfrm>
-              <a:off x="4590402" y="7856817"/>
+              <a:off x="4590402" y="7775572"/>
               <a:ext cx="135612" cy="89118"/>
             </a:xfrm>
             <a:prstGeom prst="rect">
@@ -6346,20 +6303,20 @@
                   <a:latin typeface="Arial"/>
                   <a:cs typeface="Arial"/>
                 </a:rPr>
-                <a:t>20</a:t>
+                <a:t>25</a:t>
               </a:r>
             </a:p>
           </p:txBody>
         </p:sp>
         <p:sp>
           <p:nvSpPr>
-            <p:cNvPr id="56" name="tx56"/>
+            <p:cNvPr id="55" name="tx55"/>
             <p:cNvSpPr/>
             <p:nvPr/>
           </p:nvSpPr>
           <p:spPr>
             <a:xfrm>
-              <a:off x="4590402" y="7177280"/>
+              <a:off x="4590402" y="7014790"/>
               <a:ext cx="135612" cy="89118"/>
             </a:xfrm>
             <a:prstGeom prst="rect">
@@ -6392,21 +6349,21 @@
                   <a:latin typeface="Arial"/>
                   <a:cs typeface="Arial"/>
                 </a:rPr>
-                <a:t>40</a:t>
+                <a:t>50</a:t>
               </a:r>
             </a:p>
           </p:txBody>
         </p:sp>
         <p:sp>
           <p:nvSpPr>
-            <p:cNvPr id="57" name="tx57"/>
+            <p:cNvPr id="56" name="tx56"/>
             <p:cNvSpPr/>
             <p:nvPr/>
           </p:nvSpPr>
           <p:spPr>
             <a:xfrm>
-              <a:off x="4590402" y="6497743"/>
-              <a:ext cx="135612" cy="89118"/>
+              <a:off x="4590402" y="6255496"/>
+              <a:ext cx="135612" cy="87630"/>
             </a:xfrm>
             <a:prstGeom prst="rect">
               <a:avLst/>
@@ -6438,55 +6395,89 @@
                   <a:latin typeface="Arial"/>
                   <a:cs typeface="Arial"/>
                 </a:rPr>
-                <a:t>60</a:t>
+                <a:t>75</a:t>
               </a:r>
             </a:p>
           </p:txBody>
         </p:sp>
         <p:sp>
           <p:nvSpPr>
-            <p:cNvPr id="58" name="tx58"/>
+            <p:cNvPr id="57" name="pl57"/>
             <p:cNvSpPr/>
             <p:nvPr/>
           </p:nvSpPr>
           <p:spPr>
             <a:xfrm>
-              <a:off x="4590402" y="5818206"/>
-              <a:ext cx="135612" cy="89118"/>
+              <a:off x="4753850" y="8581835"/>
+              <a:ext cx="34794" cy="0"/>
             </a:xfrm>
-            <a:prstGeom prst="rect">
+            <a:custGeom>
               <a:avLst/>
-            </a:prstGeom>
-            <a:noFill/>
+              <a:pathLst>
+                <a:path w="34794" h="0">
+                  <a:moveTo>
+                    <a:pt x="0" y="0"/>
+                  </a:moveTo>
+                  <a:lnTo>
+                    <a:pt x="34794" y="0"/>
+                  </a:lnTo>
+                </a:path>
+              </a:pathLst>
+            </a:custGeom>
+            <a:ln w="13550" cap="flat">
+              <a:solidFill>
+                <a:srgbClr val="333333">
+                  <a:alpha val="100000"/>
+                </a:srgbClr>
+              </a:solidFill>
+              <a:prstDash val="solid"/>
+              <a:round/>
+            </a:ln>
           </p:spPr>
           <p:txBody>
-            <a:bodyPr lIns="0" rIns="0" tIns="0" bIns="0" anchorCtr="1" anchor="ctr" wrap="none"/>
+            <a:bodyPr/>
             <a:lstStyle/>
-            <a:p>
-              <a:pPr algn="l" marL="0" marR="0" indent="0">
-                <a:lnSpc>
-                  <a:spcPts val="960"/>
-                </a:lnSpc>
-                <a:spcBef>
-                  <a:spcPts val="0"/>
-                </a:spcBef>
-                <a:spcAft>
-                  <a:spcPts val="0"/>
-                </a:spcAft>
-              </a:pPr>
-              <a:r>
-                <a:rPr sz="960">
-                  <a:solidFill>
-                    <a:srgbClr val="4D4D4D">
-                      <a:alpha val="100000"/>
-                    </a:srgbClr>
-                  </a:solidFill>
-                  <a:latin typeface="Arial"/>
-                  <a:cs typeface="Arial"/>
-                </a:rPr>
-                <a:t>80</a:t>
-              </a:r>
-            </a:p>
+            <a:p/>
+          </p:txBody>
+        </p:sp>
+        <p:sp>
+          <p:nvSpPr>
+            <p:cNvPr id="58" name="pl58"/>
+            <p:cNvSpPr/>
+            <p:nvPr/>
+          </p:nvSpPr>
+          <p:spPr>
+            <a:xfrm>
+              <a:off x="4753850" y="7821054"/>
+              <a:ext cx="34794" cy="0"/>
+            </a:xfrm>
+            <a:custGeom>
+              <a:avLst/>
+              <a:pathLst>
+                <a:path w="34794" h="0">
+                  <a:moveTo>
+                    <a:pt x="0" y="0"/>
+                  </a:moveTo>
+                  <a:lnTo>
+                    <a:pt x="34794" y="0"/>
+                  </a:lnTo>
+                </a:path>
+              </a:pathLst>
+            </a:custGeom>
+            <a:ln w="13550" cap="flat">
+              <a:solidFill>
+                <a:srgbClr val="333333">
+                  <a:alpha val="100000"/>
+                </a:srgbClr>
+              </a:solidFill>
+              <a:prstDash val="solid"/>
+              <a:round/>
+            </a:ln>
+          </p:spPr>
+          <p:txBody>
+            <a:bodyPr/>
+            <a:lstStyle/>
+            <a:p/>
           </p:txBody>
         </p:sp>
         <p:sp>
@@ -6497,7 +6488,7 @@
           </p:nvSpPr>
           <p:spPr>
             <a:xfrm>
-              <a:off x="4753850" y="8581835"/>
+              <a:off x="4753850" y="7060272"/>
               <a:ext cx="34794" cy="0"/>
             </a:xfrm>
             <a:custGeom>
@@ -6537,7 +6528,7 @@
           </p:nvSpPr>
           <p:spPr>
             <a:xfrm>
-              <a:off x="4753850" y="7902299"/>
+              <a:off x="4753850" y="6299490"/>
               <a:ext cx="34794" cy="0"/>
             </a:xfrm>
             <a:custGeom>
@@ -6577,18 +6568,18 @@
           </p:nvSpPr>
           <p:spPr>
             <a:xfrm>
-              <a:off x="4753850" y="7222762"/>
-              <a:ext cx="34794" cy="0"/>
+              <a:off x="5694178" y="8581835"/>
+              <a:ext cx="0" cy="34794"/>
             </a:xfrm>
             <a:custGeom>
               <a:avLst/>
               <a:pathLst>
-                <a:path w="34794" h="0">
+                <a:path w="0" h="34794">
                   <a:moveTo>
+                    <a:pt x="0" y="34794"/>
+                  </a:moveTo>
+                  <a:lnTo>
                     <a:pt x="0" y="0"/>
-                  </a:moveTo>
-                  <a:lnTo>
-                    <a:pt x="34794" y="0"/>
                   </a:lnTo>
                 </a:path>
               </a:pathLst>
@@ -6617,18 +6608,18 @@
           </p:nvSpPr>
           <p:spPr>
             <a:xfrm>
-              <a:off x="4753850" y="6543225"/>
-              <a:ext cx="34794" cy="0"/>
+              <a:off x="7278861" y="8581835"/>
+              <a:ext cx="0" cy="34794"/>
             </a:xfrm>
             <a:custGeom>
               <a:avLst/>
               <a:pathLst>
-                <a:path w="34794" h="0">
+                <a:path w="0" h="34794">
                   <a:moveTo>
+                    <a:pt x="0" y="34794"/>
+                  </a:moveTo>
+                  <a:lnTo>
                     <a:pt x="0" y="0"/>
-                  </a:moveTo>
-                  <a:lnTo>
-                    <a:pt x="34794" y="0"/>
                   </a:lnTo>
                 </a:path>
               </a:pathLst>
@@ -6657,18 +6648,18 @@
           </p:nvSpPr>
           <p:spPr>
             <a:xfrm>
-              <a:off x="4753850" y="5863688"/>
-              <a:ext cx="34794" cy="0"/>
+              <a:off x="8863544" y="8581835"/>
+              <a:ext cx="0" cy="34794"/>
             </a:xfrm>
             <a:custGeom>
               <a:avLst/>
               <a:pathLst>
-                <a:path w="34794" h="0">
+                <a:path w="0" h="34794">
                   <a:moveTo>
+                    <a:pt x="0" y="34794"/>
+                  </a:moveTo>
+                  <a:lnTo>
                     <a:pt x="0" y="0"/>
-                  </a:moveTo>
-                  <a:lnTo>
-                    <a:pt x="34794" y="0"/>
                   </a:lnTo>
                 </a:path>
               </a:pathLst>
@@ -6697,7 +6688,7 @@
           </p:nvSpPr>
           <p:spPr>
             <a:xfrm>
-              <a:off x="5694178" y="8581835"/>
+              <a:off x="10448227" y="8581835"/>
               <a:ext cx="0" cy="34794"/>
             </a:xfrm>
             <a:custGeom>
@@ -6731,127 +6722,7 @@
         </p:sp>
         <p:sp>
           <p:nvSpPr>
-            <p:cNvPr id="65" name="pl65"/>
-            <p:cNvSpPr/>
-            <p:nvPr/>
-          </p:nvSpPr>
-          <p:spPr>
-            <a:xfrm>
-              <a:off x="7278861" y="8581835"/>
-              <a:ext cx="0" cy="34794"/>
-            </a:xfrm>
-            <a:custGeom>
-              <a:avLst/>
-              <a:pathLst>
-                <a:path w="0" h="34794">
-                  <a:moveTo>
-                    <a:pt x="0" y="34794"/>
-                  </a:moveTo>
-                  <a:lnTo>
-                    <a:pt x="0" y="0"/>
-                  </a:lnTo>
-                </a:path>
-              </a:pathLst>
-            </a:custGeom>
-            <a:ln w="13550" cap="flat">
-              <a:solidFill>
-                <a:srgbClr val="333333">
-                  <a:alpha val="100000"/>
-                </a:srgbClr>
-              </a:solidFill>
-              <a:prstDash val="solid"/>
-              <a:round/>
-            </a:ln>
-          </p:spPr>
-          <p:txBody>
-            <a:bodyPr/>
-            <a:lstStyle/>
-            <a:p/>
-          </p:txBody>
-        </p:sp>
-        <p:sp>
-          <p:nvSpPr>
-            <p:cNvPr id="66" name="pl66"/>
-            <p:cNvSpPr/>
-            <p:nvPr/>
-          </p:nvSpPr>
-          <p:spPr>
-            <a:xfrm>
-              <a:off x="8863544" y="8581835"/>
-              <a:ext cx="0" cy="34794"/>
-            </a:xfrm>
-            <a:custGeom>
-              <a:avLst/>
-              <a:pathLst>
-                <a:path w="0" h="34794">
-                  <a:moveTo>
-                    <a:pt x="0" y="34794"/>
-                  </a:moveTo>
-                  <a:lnTo>
-                    <a:pt x="0" y="0"/>
-                  </a:lnTo>
-                </a:path>
-              </a:pathLst>
-            </a:custGeom>
-            <a:ln w="13550" cap="flat">
-              <a:solidFill>
-                <a:srgbClr val="333333">
-                  <a:alpha val="100000"/>
-                </a:srgbClr>
-              </a:solidFill>
-              <a:prstDash val="solid"/>
-              <a:round/>
-            </a:ln>
-          </p:spPr>
-          <p:txBody>
-            <a:bodyPr/>
-            <a:lstStyle/>
-            <a:p/>
-          </p:txBody>
-        </p:sp>
-        <p:sp>
-          <p:nvSpPr>
-            <p:cNvPr id="67" name="pl67"/>
-            <p:cNvSpPr/>
-            <p:nvPr/>
-          </p:nvSpPr>
-          <p:spPr>
-            <a:xfrm>
-              <a:off x="10448227" y="8581835"/>
-              <a:ext cx="0" cy="34794"/>
-            </a:xfrm>
-            <a:custGeom>
-              <a:avLst/>
-              <a:pathLst>
-                <a:path w="0" h="34794">
-                  <a:moveTo>
-                    <a:pt x="0" y="34794"/>
-                  </a:moveTo>
-                  <a:lnTo>
-                    <a:pt x="0" y="0"/>
-                  </a:lnTo>
-                </a:path>
-              </a:pathLst>
-            </a:custGeom>
-            <a:ln w="13550" cap="flat">
-              <a:solidFill>
-                <a:srgbClr val="333333">
-                  <a:alpha val="100000"/>
-                </a:srgbClr>
-              </a:solidFill>
-              <a:prstDash val="solid"/>
-              <a:round/>
-            </a:ln>
-          </p:spPr>
-          <p:txBody>
-            <a:bodyPr/>
-            <a:lstStyle/>
-            <a:p/>
-          </p:txBody>
-        </p:sp>
-        <p:sp>
-          <p:nvSpPr>
-            <p:cNvPr id="68" name="tx68"/>
+            <p:cNvPr id="65" name="tx65"/>
             <p:cNvSpPr/>
             <p:nvPr/>
           </p:nvSpPr>
@@ -6897,7 +6768,7 @@
         </p:sp>
         <p:sp>
           <p:nvSpPr>
-            <p:cNvPr id="69" name="tx69"/>
+            <p:cNvPr id="66" name="tx66"/>
             <p:cNvSpPr/>
             <p:nvPr/>
           </p:nvSpPr>
@@ -6943,7 +6814,7 @@
         </p:sp>
         <p:sp>
           <p:nvSpPr>
-            <p:cNvPr id="70" name="tx70"/>
+            <p:cNvPr id="67" name="tx67"/>
             <p:cNvSpPr/>
             <p:nvPr/>
           </p:nvSpPr>
@@ -6989,7 +6860,7 @@
         </p:sp>
         <p:sp>
           <p:nvSpPr>
-            <p:cNvPr id="71" name="tx71"/>
+            <p:cNvPr id="68" name="tx68"/>
             <p:cNvSpPr/>
             <p:nvPr/>
           </p:nvSpPr>
@@ -7035,7 +6906,7 @@
         </p:sp>
         <p:sp>
           <p:nvSpPr>
-            <p:cNvPr id="72" name="tx72"/>
+            <p:cNvPr id="69" name="tx69"/>
             <p:cNvSpPr/>
             <p:nvPr/>
           </p:nvSpPr>
@@ -7081,7 +6952,7 @@
         </p:sp>
         <p:sp>
           <p:nvSpPr>
-            <p:cNvPr id="73" name="tx73"/>
+            <p:cNvPr id="70" name="tx70"/>
             <p:cNvSpPr/>
             <p:nvPr/>
           </p:nvSpPr>

</xml_diff>